<commit_message>
A first draft of the instructions
(I doubt the English sounds very natural + possible typos)
</commit_message>
<xml_diff>
--- a/instuctions_numerals.pptx
+++ b/instuctions_numerals.pptx
@@ -7,6 +7,7 @@
   <p:sldIdLst>
     <p:sldId id="256" r:id="rId2"/>
     <p:sldId id="257" r:id="rId3"/>
+    <p:sldId id="258" r:id="rId4"/>
   </p:sldIdLst>
   <p:sldSz cx="9144000" cy="6858000" type="screen4x3"/>
   <p:notesSz cx="6858000" cy="9144000"/>
@@ -303,7 +304,7 @@
             <a:fld id="{AA309A6D-C09C-4548-B29A-6CF363A7E532}" type="datetimeFigureOut">
               <a:rPr lang="fr-FR" smtClean="0"/>
               <a:pPr/>
-              <a:t>18/11/2010</a:t>
+              <a:t>11/5/13</a:t>
             </a:fld>
             <a:endParaRPr lang="fr-BE"/>
           </a:p>
@@ -356,7 +357,7 @@
             <a:fld id="{CF4668DC-857F-487D-BFFA-8C0CA5037977}" type="slidenum">
               <a:rPr lang="fr-BE" smtClean="0"/>
               <a:pPr/>
-              <a:t>‹N°›</a:t>
+              <a:t>‹#›</a:t>
             </a:fld>
             <a:endParaRPr lang="fr-BE"/>
           </a:p>
@@ -658,7 +659,7 @@
             <a:fld id="{AA309A6D-C09C-4548-B29A-6CF363A7E532}" type="datetimeFigureOut">
               <a:rPr lang="fr-FR" smtClean="0"/>
               <a:pPr/>
-              <a:t>18/11/2010</a:t>
+              <a:t>11/5/13</a:t>
             </a:fld>
             <a:endParaRPr lang="fr-BE"/>
           </a:p>
@@ -701,7 +702,7 @@
             <a:fld id="{CF4668DC-857F-487D-BFFA-8C0CA5037977}" type="slidenum">
               <a:rPr lang="fr-BE" smtClean="0"/>
               <a:pPr/>
-              <a:t>‹N°›</a:t>
+              <a:t>‹#›</a:t>
             </a:fld>
             <a:endParaRPr lang="fr-BE"/>
           </a:p>
@@ -835,7 +836,7 @@
             <a:fld id="{AA309A6D-C09C-4548-B29A-6CF363A7E532}" type="datetimeFigureOut">
               <a:rPr lang="fr-FR" smtClean="0"/>
               <a:pPr/>
-              <a:t>18/11/2010</a:t>
+              <a:t>11/5/13</a:t>
             </a:fld>
             <a:endParaRPr lang="fr-BE"/>
           </a:p>
@@ -878,7 +879,7 @@
             <a:fld id="{CF4668DC-857F-487D-BFFA-8C0CA5037977}" type="slidenum">
               <a:rPr lang="fr-BE" smtClean="0"/>
               <a:pPr/>
-              <a:t>‹N°›</a:t>
+              <a:t>‹#›</a:t>
             </a:fld>
             <a:endParaRPr lang="fr-BE"/>
           </a:p>
@@ -950,7 +951,7 @@
             <a:fld id="{AA309A6D-C09C-4548-B29A-6CF363A7E532}" type="datetimeFigureOut">
               <a:rPr lang="fr-FR" smtClean="0"/>
               <a:pPr/>
-              <a:t>18/11/2010</a:t>
+              <a:t>11/5/13</a:t>
             </a:fld>
             <a:endParaRPr lang="fr-BE"/>
           </a:p>
@@ -993,7 +994,7 @@
             <a:fld id="{CF4668DC-857F-487D-BFFA-8C0CA5037977}" type="slidenum">
               <a:rPr lang="fr-BE" smtClean="0"/>
               <a:pPr/>
-              <a:t>‹N°›</a:t>
+              <a:t>‹#›</a:t>
             </a:fld>
             <a:endParaRPr lang="fr-BE"/>
           </a:p>
@@ -1310,7 +1311,7 @@
             <a:fld id="{AA309A6D-C09C-4548-B29A-6CF363A7E532}" type="datetimeFigureOut">
               <a:rPr lang="fr-FR" smtClean="0"/>
               <a:pPr/>
-              <a:t>18/11/2010</a:t>
+              <a:t>11/5/13</a:t>
             </a:fld>
             <a:endParaRPr lang="fr-BE"/>
           </a:p>
@@ -1505,7 +1506,7 @@
             <a:fld id="{CF4668DC-857F-487D-BFFA-8C0CA5037977}" type="slidenum">
               <a:rPr lang="fr-BE" smtClean="0"/>
               <a:pPr/>
-              <a:t>‹N°›</a:t>
+              <a:t>‹#›</a:t>
             </a:fld>
             <a:endParaRPr lang="fr-BE"/>
           </a:p>
@@ -1577,7 +1578,7 @@
             <a:fld id="{AA309A6D-C09C-4548-B29A-6CF363A7E532}" type="datetimeFigureOut">
               <a:rPr lang="fr-FR" smtClean="0"/>
               <a:pPr/>
-              <a:t>18/11/2010</a:t>
+              <a:t>11/5/13</a:t>
             </a:fld>
             <a:endParaRPr lang="fr-BE"/>
           </a:p>
@@ -1620,7 +1621,7 @@
             <a:fld id="{CF4668DC-857F-487D-BFFA-8C0CA5037977}" type="slidenum">
               <a:rPr lang="fr-BE" smtClean="0"/>
               <a:pPr/>
-              <a:t>‹N°›</a:t>
+              <a:t>‹#›</a:t>
             </a:fld>
             <a:endParaRPr lang="fr-BE"/>
           </a:p>
@@ -1941,7 +1942,7 @@
             <a:fld id="{AA309A6D-C09C-4548-B29A-6CF363A7E532}" type="datetimeFigureOut">
               <a:rPr lang="fr-FR" smtClean="0"/>
               <a:pPr/>
-              <a:t>18/11/2010</a:t>
+              <a:t>11/5/13</a:t>
             </a:fld>
             <a:endParaRPr lang="fr-BE"/>
           </a:p>
@@ -1984,7 +1985,7 @@
             <a:fld id="{CF4668DC-857F-487D-BFFA-8C0CA5037977}" type="slidenum">
               <a:rPr lang="fr-BE" smtClean="0"/>
               <a:pPr/>
-              <a:t>‹N°›</a:t>
+              <a:t>‹#›</a:t>
             </a:fld>
             <a:endParaRPr lang="fr-BE"/>
           </a:p>
@@ -2170,7 +2171,7 @@
             <a:fld id="{AA309A6D-C09C-4548-B29A-6CF363A7E532}" type="datetimeFigureOut">
               <a:rPr lang="fr-FR" smtClean="0"/>
               <a:pPr/>
-              <a:t>18/11/2010</a:t>
+              <a:t>11/5/13</a:t>
             </a:fld>
             <a:endParaRPr lang="fr-BE"/>
           </a:p>
@@ -2213,7 +2214,7 @@
             <a:fld id="{CF4668DC-857F-487D-BFFA-8C0CA5037977}" type="slidenum">
               <a:rPr lang="fr-BE" smtClean="0"/>
               <a:pPr/>
-              <a:t>‹N°›</a:t>
+              <a:t>‹#›</a:t>
             </a:fld>
             <a:endParaRPr lang="fr-BE"/>
           </a:p>
@@ -2262,7 +2263,7 @@
             <a:fld id="{AA309A6D-C09C-4548-B29A-6CF363A7E532}" type="datetimeFigureOut">
               <a:rPr lang="fr-FR" smtClean="0"/>
               <a:pPr/>
-              <a:t>18/11/2010</a:t>
+              <a:t>11/5/13</a:t>
             </a:fld>
             <a:endParaRPr lang="fr-BE"/>
           </a:p>
@@ -2305,7 +2306,7 @@
             <a:fld id="{CF4668DC-857F-487D-BFFA-8C0CA5037977}" type="slidenum">
               <a:rPr lang="fr-BE" smtClean="0"/>
               <a:pPr/>
-              <a:t>‹N°›</a:t>
+              <a:t>‹#›</a:t>
             </a:fld>
             <a:endParaRPr lang="fr-BE"/>
           </a:p>
@@ -2531,7 +2532,7 @@
             <a:fld id="{AA309A6D-C09C-4548-B29A-6CF363A7E532}" type="datetimeFigureOut">
               <a:rPr lang="fr-FR" smtClean="0"/>
               <a:pPr/>
-              <a:t>18/11/2010</a:t>
+              <a:t>11/5/13</a:t>
             </a:fld>
             <a:endParaRPr lang="fr-BE"/>
           </a:p>
@@ -2574,7 +2575,7 @@
             <a:fld id="{CF4668DC-857F-487D-BFFA-8C0CA5037977}" type="slidenum">
               <a:rPr lang="fr-BE" smtClean="0"/>
               <a:pPr/>
-              <a:t>‹N°›</a:t>
+              <a:t>‹#›</a:t>
             </a:fld>
             <a:endParaRPr lang="fr-BE"/>
           </a:p>
@@ -2761,7 +2762,7 @@
             <a:fld id="{AA309A6D-C09C-4548-B29A-6CF363A7E532}" type="datetimeFigureOut">
               <a:rPr lang="fr-FR" smtClean="0"/>
               <a:pPr/>
-              <a:t>18/11/2010</a:t>
+              <a:t>11/5/13</a:t>
             </a:fld>
             <a:endParaRPr lang="fr-BE"/>
           </a:p>
@@ -2814,7 +2815,7 @@
             <a:fld id="{CF4668DC-857F-487D-BFFA-8C0CA5037977}" type="slidenum">
               <a:rPr lang="fr-BE" smtClean="0"/>
               <a:pPr/>
-              <a:t>‹N°›</a:t>
+              <a:t>‹#›</a:t>
             </a:fld>
             <a:endParaRPr lang="fr-BE"/>
           </a:p>
@@ -3262,7 +3263,7 @@
             <a:fld id="{AA309A6D-C09C-4548-B29A-6CF363A7E532}" type="datetimeFigureOut">
               <a:rPr lang="fr-FR" smtClean="0"/>
               <a:pPr/>
-              <a:t>18/11/2010</a:t>
+              <a:t>11/5/13</a:t>
             </a:fld>
             <a:endParaRPr lang="fr-BE"/>
           </a:p>
@@ -3345,7 +3346,7 @@
             <a:fld id="{CF4668DC-857F-487D-BFFA-8C0CA5037977}" type="slidenum">
               <a:rPr lang="fr-BE" smtClean="0"/>
               <a:pPr/>
-              <a:t>‹N°›</a:t>
+              <a:t>‹#›</a:t>
             </a:fld>
             <a:endParaRPr lang="fr-BE"/>
           </a:p>
@@ -3675,8 +3676,8 @@
         </p:nvSpPr>
         <p:spPr>
           <a:xfrm>
-            <a:off x="107504" y="0"/>
-            <a:ext cx="8928992" cy="1107996"/>
+            <a:off x="107504" y="-27384"/>
+            <a:ext cx="8928992" cy="969496"/>
           </a:xfrm>
           <a:prstGeom prst="rect">
             <a:avLst/>
@@ -3690,6 +3691,62 @@
           <a:lstStyle/>
           <a:p>
             <a:pPr algn="ctr"/>
+            <a:endParaRPr lang="fr-FR" sz="600" b="1" dirty="0" smtClean="0">
+              <a:ln w="12700">
+                <a:solidFill>
+                  <a:schemeClr val="tx2">
+                    <a:satMod val="155000"/>
+                  </a:schemeClr>
+                </a:solidFill>
+                <a:prstDash val="solid"/>
+              </a:ln>
+              <a:solidFill>
+                <a:schemeClr val="bg2">
+                  <a:tint val="85000"/>
+                  <a:satMod val="155000"/>
+                </a:schemeClr>
+              </a:solidFill>
+              <a:effectLst>
+                <a:outerShdw blurRad="41275" dist="20320" dir="1800000" algn="tl" rotWithShape="0">
+                  <a:srgbClr val="000000">
+                    <a:alpha val="40000"/>
+                  </a:srgbClr>
+                </a:outerShdw>
+              </a:effectLst>
+              <a:latin typeface="Apple Chancery"/>
+              <a:cs typeface="Apple Chancery"/>
+            </a:endParaRPr>
+          </a:p>
+          <a:p>
+            <a:pPr algn="ctr"/>
+            <a:r>
+              <a:rPr lang="fr-FR" sz="2200" b="1" dirty="0" err="1" smtClean="0">
+                <a:ln w="12700">
+                  <a:solidFill>
+                    <a:schemeClr val="tx2">
+                      <a:satMod val="155000"/>
+                    </a:schemeClr>
+                  </a:solidFill>
+                  <a:prstDash val="solid"/>
+                </a:ln>
+                <a:solidFill>
+                  <a:schemeClr val="bg2">
+                    <a:tint val="85000"/>
+                    <a:satMod val="155000"/>
+                  </a:schemeClr>
+                </a:solidFill>
+                <a:effectLst>
+                  <a:outerShdw blurRad="41275" dist="20320" dir="1800000" algn="tl" rotWithShape="0">
+                    <a:srgbClr val="000000">
+                      <a:alpha val="40000"/>
+                    </a:srgbClr>
+                  </a:outerShdw>
+                </a:effectLst>
+                <a:latin typeface="Apple Chancery"/>
+                <a:cs typeface="Apple Chancery"/>
+              </a:rPr>
+              <a:t>Welcome</a:t>
+            </a:r>
             <a:r>
               <a:rPr lang="fr-FR" sz="2200" b="1" dirty="0" smtClean="0">
                 <a:ln w="12700">
@@ -3713,20 +3770,383 @@
                     </a:srgbClr>
                   </a:outerShdw>
                 </a:effectLst>
+                <a:latin typeface="Apple Chancery"/>
+                <a:cs typeface="Apple Chancery"/>
               </a:rPr>
-              <a:t>Bonjour et merci de participer à cette expérience,</a:t>
-            </a:r>
-          </a:p>
-          <a:p>
-            <a:endParaRPr lang="fr-FR" sz="800" dirty="0" smtClean="0"/>
+              <a:t> and </a:t>
+            </a:r>
+            <a:r>
+              <a:rPr lang="fr-FR" sz="2200" b="1" dirty="0" err="1" smtClean="0">
+                <a:ln w="12700">
+                  <a:solidFill>
+                    <a:schemeClr val="tx2">
+                      <a:satMod val="155000"/>
+                    </a:schemeClr>
+                  </a:solidFill>
+                  <a:prstDash val="solid"/>
+                </a:ln>
+                <a:solidFill>
+                  <a:schemeClr val="bg2">
+                    <a:tint val="85000"/>
+                    <a:satMod val="155000"/>
+                  </a:schemeClr>
+                </a:solidFill>
+                <a:effectLst>
+                  <a:outerShdw blurRad="41275" dist="20320" dir="1800000" algn="tl" rotWithShape="0">
+                    <a:srgbClr val="000000">
+                      <a:alpha val="40000"/>
+                    </a:srgbClr>
+                  </a:outerShdw>
+                </a:effectLst>
+                <a:latin typeface="Apple Chancery"/>
+                <a:cs typeface="Apple Chancery"/>
+              </a:rPr>
+              <a:t>thanks</a:t>
+            </a:r>
+            <a:r>
+              <a:rPr lang="fr-FR" sz="2200" b="1" dirty="0" smtClean="0">
+                <a:ln w="12700">
+                  <a:solidFill>
+                    <a:schemeClr val="tx2">
+                      <a:satMod val="155000"/>
+                    </a:schemeClr>
+                  </a:solidFill>
+                  <a:prstDash val="solid"/>
+                </a:ln>
+                <a:solidFill>
+                  <a:schemeClr val="bg2">
+                    <a:tint val="85000"/>
+                    <a:satMod val="155000"/>
+                  </a:schemeClr>
+                </a:solidFill>
+                <a:effectLst>
+                  <a:outerShdw blurRad="41275" dist="20320" dir="1800000" algn="tl" rotWithShape="0">
+                    <a:srgbClr val="000000">
+                      <a:alpha val="40000"/>
+                    </a:srgbClr>
+                  </a:outerShdw>
+                </a:effectLst>
+                <a:latin typeface="Apple Chancery"/>
+                <a:cs typeface="Apple Chancery"/>
+              </a:rPr>
+              <a:t> for </a:t>
+            </a:r>
+            <a:r>
+              <a:rPr lang="fr-FR" sz="2200" b="1" dirty="0" err="1" smtClean="0">
+                <a:ln w="12700">
+                  <a:solidFill>
+                    <a:schemeClr val="tx2">
+                      <a:satMod val="155000"/>
+                    </a:schemeClr>
+                  </a:solidFill>
+                  <a:prstDash val="solid"/>
+                </a:ln>
+                <a:solidFill>
+                  <a:schemeClr val="bg2">
+                    <a:tint val="85000"/>
+                    <a:satMod val="155000"/>
+                  </a:schemeClr>
+                </a:solidFill>
+                <a:effectLst>
+                  <a:outerShdw blurRad="41275" dist="20320" dir="1800000" algn="tl" rotWithShape="0">
+                    <a:srgbClr val="000000">
+                      <a:alpha val="40000"/>
+                    </a:srgbClr>
+                  </a:outerShdw>
+                </a:effectLst>
+                <a:latin typeface="Apple Chancery"/>
+                <a:cs typeface="Apple Chancery"/>
+              </a:rPr>
+              <a:t>participating</a:t>
+            </a:r>
+            <a:r>
+              <a:rPr lang="fr-FR" sz="2200" b="1" dirty="0" smtClean="0">
+                <a:ln w="12700">
+                  <a:solidFill>
+                    <a:schemeClr val="tx2">
+                      <a:satMod val="155000"/>
+                    </a:schemeClr>
+                  </a:solidFill>
+                  <a:prstDash val="solid"/>
+                </a:ln>
+                <a:solidFill>
+                  <a:schemeClr val="bg2">
+                    <a:tint val="85000"/>
+                    <a:satMod val="155000"/>
+                  </a:schemeClr>
+                </a:solidFill>
+                <a:effectLst>
+                  <a:outerShdw blurRad="41275" dist="20320" dir="1800000" algn="tl" rotWithShape="0">
+                    <a:srgbClr val="000000">
+                      <a:alpha val="40000"/>
+                    </a:srgbClr>
+                  </a:outerShdw>
+                </a:effectLst>
+                <a:latin typeface="Apple Chancery"/>
+                <a:cs typeface="Apple Chancery"/>
+              </a:rPr>
+              <a:t> in </a:t>
+            </a:r>
+            <a:r>
+              <a:rPr lang="fr-FR" sz="2200" b="1" dirty="0" err="1" smtClean="0">
+                <a:ln w="12700">
+                  <a:solidFill>
+                    <a:schemeClr val="tx2">
+                      <a:satMod val="155000"/>
+                    </a:schemeClr>
+                  </a:solidFill>
+                  <a:prstDash val="solid"/>
+                </a:ln>
+                <a:solidFill>
+                  <a:schemeClr val="bg2">
+                    <a:tint val="85000"/>
+                    <a:satMod val="155000"/>
+                  </a:schemeClr>
+                </a:solidFill>
+                <a:effectLst>
+                  <a:outerShdw blurRad="41275" dist="20320" dir="1800000" algn="tl" rotWithShape="0">
+                    <a:srgbClr val="000000">
+                      <a:alpha val="40000"/>
+                    </a:srgbClr>
+                  </a:outerShdw>
+                </a:effectLst>
+                <a:latin typeface="Apple Chancery"/>
+                <a:cs typeface="Apple Chancery"/>
+              </a:rPr>
+              <a:t>this</a:t>
+            </a:r>
+            <a:r>
+              <a:rPr lang="fr-FR" sz="2200" b="1" dirty="0" smtClean="0">
+                <a:ln w="12700">
+                  <a:solidFill>
+                    <a:schemeClr val="tx2">
+                      <a:satMod val="155000"/>
+                    </a:schemeClr>
+                  </a:solidFill>
+                  <a:prstDash val="solid"/>
+                </a:ln>
+                <a:solidFill>
+                  <a:schemeClr val="bg2">
+                    <a:tint val="85000"/>
+                    <a:satMod val="155000"/>
+                  </a:schemeClr>
+                </a:solidFill>
+                <a:effectLst>
+                  <a:outerShdw blurRad="41275" dist="20320" dir="1800000" algn="tl" rotWithShape="0">
+                    <a:srgbClr val="000000">
+                      <a:alpha val="40000"/>
+                    </a:srgbClr>
+                  </a:outerShdw>
+                </a:effectLst>
+                <a:latin typeface="Apple Chancery"/>
+                <a:cs typeface="Apple Chancery"/>
+              </a:rPr>
+              <a:t> </a:t>
+            </a:r>
+            <a:r>
+              <a:rPr lang="fr-FR" sz="2200" b="1" dirty="0" err="1" smtClean="0">
+                <a:ln w="12700">
+                  <a:solidFill>
+                    <a:schemeClr val="tx2">
+                      <a:satMod val="155000"/>
+                    </a:schemeClr>
+                  </a:solidFill>
+                  <a:prstDash val="solid"/>
+                </a:ln>
+                <a:solidFill>
+                  <a:schemeClr val="bg2">
+                    <a:tint val="85000"/>
+                    <a:satMod val="155000"/>
+                  </a:schemeClr>
+                </a:solidFill>
+                <a:effectLst>
+                  <a:outerShdw blurRad="41275" dist="20320" dir="1800000" algn="tl" rotWithShape="0">
+                    <a:srgbClr val="000000">
+                      <a:alpha val="40000"/>
+                    </a:srgbClr>
+                  </a:outerShdw>
+                </a:effectLst>
+                <a:latin typeface="Apple Chancery"/>
+                <a:cs typeface="Apple Chancery"/>
+              </a:rPr>
+              <a:t>study</a:t>
+            </a:r>
+            <a:r>
+              <a:rPr lang="fr-FR" sz="2200" b="1" dirty="0" smtClean="0">
+                <a:ln w="12700">
+                  <a:solidFill>
+                    <a:schemeClr val="tx2">
+                      <a:satMod val="155000"/>
+                    </a:schemeClr>
+                  </a:solidFill>
+                  <a:prstDash val="solid"/>
+                </a:ln>
+                <a:solidFill>
+                  <a:schemeClr val="bg2">
+                    <a:tint val="85000"/>
+                    <a:satMod val="155000"/>
+                  </a:schemeClr>
+                </a:solidFill>
+                <a:effectLst>
+                  <a:outerShdw blurRad="41275" dist="20320" dir="1800000" algn="tl" rotWithShape="0">
+                    <a:srgbClr val="000000">
+                      <a:alpha val="40000"/>
+                    </a:srgbClr>
+                  </a:outerShdw>
+                </a:effectLst>
+                <a:latin typeface="Apple Chancery"/>
+                <a:cs typeface="Apple Chancery"/>
+              </a:rPr>
+              <a:t>,</a:t>
+            </a:r>
+            <a:endParaRPr lang="fr-FR" sz="2200" b="1" dirty="0" smtClean="0">
+              <a:ln w="12700">
+                <a:solidFill>
+                  <a:schemeClr val="tx2">
+                    <a:satMod val="155000"/>
+                  </a:schemeClr>
+                </a:solidFill>
+                <a:prstDash val="solid"/>
+              </a:ln>
+              <a:solidFill>
+                <a:schemeClr val="bg2">
+                  <a:tint val="85000"/>
+                  <a:satMod val="155000"/>
+                </a:schemeClr>
+              </a:solidFill>
+              <a:effectLst>
+                <a:outerShdw blurRad="41275" dist="20320" dir="1800000" algn="tl" rotWithShape="0">
+                  <a:srgbClr val="000000">
+                    <a:alpha val="40000"/>
+                  </a:srgbClr>
+                </a:outerShdw>
+              </a:effectLst>
+              <a:latin typeface="Apple Chancery"/>
+              <a:cs typeface="Apple Chancery"/>
+            </a:endParaRPr>
           </a:p>
           <a:p>
             <a:pPr algn="just"/>
-            <a:r>
-              <a:rPr lang="fr-FR" dirty="0" smtClean="0"/>
-              <a:t>Vous allez voir des phrases et des situations dans lesquelles des points sont coloriés dans certaines couleurs. Voici un exemple:</a:t>
-            </a:r>
-            <a:endParaRPr lang="en-GB" dirty="0"/>
+            <a:endParaRPr lang="fr-FR" sz="1050" dirty="0" smtClean="0"/>
+          </a:p>
+          <a:p>
+            <a:pPr algn="just"/>
+            <a:r>
+              <a:rPr lang="fr-FR" dirty="0" smtClean="0"/>
+              <a:t>You </a:t>
+            </a:r>
+            <a:r>
+              <a:rPr lang="fr-FR" dirty="0" err="1" smtClean="0"/>
+              <a:t>will</a:t>
+            </a:r>
+            <a:r>
+              <a:rPr lang="fr-FR" dirty="0" smtClean="0"/>
+              <a:t> </a:t>
+            </a:r>
+            <a:r>
+              <a:rPr lang="fr-FR" dirty="0" err="1" smtClean="0"/>
+              <a:t>be</a:t>
+            </a:r>
+            <a:r>
+              <a:rPr lang="fr-FR" dirty="0" smtClean="0"/>
+              <a:t> </a:t>
+            </a:r>
+            <a:r>
+              <a:rPr lang="fr-FR" dirty="0" err="1" smtClean="0"/>
+              <a:t>presented</a:t>
+            </a:r>
+            <a:r>
+              <a:rPr lang="fr-FR" dirty="0" smtClean="0"/>
+              <a:t> </a:t>
+            </a:r>
+            <a:r>
+              <a:rPr lang="fr-FR" dirty="0" err="1" smtClean="0"/>
+              <a:t>with</a:t>
+            </a:r>
+            <a:r>
+              <a:rPr lang="fr-FR" dirty="0" smtClean="0"/>
+              <a:t> sentence-</a:t>
+            </a:r>
+            <a:r>
+              <a:rPr lang="fr-FR" dirty="0" err="1" smtClean="0"/>
+              <a:t>picture</a:t>
+            </a:r>
+            <a:r>
+              <a:rPr lang="fr-FR" dirty="0" smtClean="0"/>
+              <a:t> items</a:t>
+            </a:r>
+            <a:r>
+              <a:rPr lang="fr-FR" dirty="0" smtClean="0"/>
+              <a:t>. </a:t>
+            </a:r>
+            <a:r>
+              <a:rPr lang="fr-FR" dirty="0" err="1" smtClean="0"/>
+              <a:t>Here</a:t>
+            </a:r>
+            <a:r>
+              <a:rPr lang="fr-FR" dirty="0" smtClean="0"/>
+              <a:t> </a:t>
+            </a:r>
+            <a:r>
+              <a:rPr lang="fr-FR" dirty="0" err="1" smtClean="0"/>
+              <a:t>is</a:t>
+            </a:r>
+            <a:r>
+              <a:rPr lang="fr-FR" dirty="0" smtClean="0"/>
+              <a:t> an </a:t>
+            </a:r>
+            <a:r>
+              <a:rPr lang="fr-FR" dirty="0" err="1" smtClean="0"/>
+              <a:t>example</a:t>
+            </a:r>
+            <a:r>
+              <a:rPr lang="fr-FR" dirty="0" smtClean="0"/>
+              <a:t> of </a:t>
+            </a:r>
+            <a:r>
+              <a:rPr lang="fr-FR" dirty="0" err="1" smtClean="0"/>
+              <a:t>what</a:t>
+            </a:r>
+            <a:r>
+              <a:rPr lang="fr-FR" dirty="0" smtClean="0"/>
+              <a:t> </a:t>
+            </a:r>
+            <a:r>
+              <a:rPr lang="fr-FR" dirty="0" err="1" smtClean="0"/>
+              <a:t>you</a:t>
+            </a:r>
+            <a:r>
+              <a:rPr lang="fr-FR" dirty="0" smtClean="0"/>
+              <a:t> </a:t>
+            </a:r>
+            <a:r>
+              <a:rPr lang="fr-FR" dirty="0" err="1" smtClean="0"/>
+              <a:t>will</a:t>
+            </a:r>
+            <a:r>
+              <a:rPr lang="fr-FR" dirty="0" smtClean="0"/>
+              <a:t> </a:t>
+            </a:r>
+            <a:r>
+              <a:rPr lang="fr-FR" dirty="0" err="1" smtClean="0"/>
+              <a:t>see</a:t>
+            </a:r>
+            <a:r>
+              <a:rPr lang="fr-FR" dirty="0" smtClean="0"/>
+              <a:t> on the </a:t>
+            </a:r>
+            <a:r>
+              <a:rPr lang="fr-FR" dirty="0" err="1" smtClean="0"/>
+              <a:t>screen</a:t>
+            </a:r>
+            <a:r>
+              <a:rPr lang="fr-FR" dirty="0" smtClean="0"/>
+              <a:t>:</a:t>
+            </a:r>
+            <a:r>
+              <a:rPr lang="fr-FR" dirty="0" smtClean="0"/>
+              <a:t> </a:t>
+            </a:r>
           </a:p>
         </p:txBody>
       </p:sp>
@@ -3739,7 +4159,7 @@
         <p:spPr>
           <a:xfrm>
             <a:off x="107504" y="3352631"/>
-            <a:ext cx="8928992" cy="3924151"/>
+            <a:ext cx="8928992" cy="3877985"/>
           </a:xfrm>
           <a:prstGeom prst="rect">
             <a:avLst/>
@@ -3755,7 +4175,743 @@
             <a:pPr algn="just"/>
             <a:r>
               <a:rPr lang="fr-FR" dirty="0" smtClean="0"/>
-              <a:t>Votre tâche est de dire si la phrase est vraie ou fausse dans cette situation. Par exemple, dans l’exemple ci-dessus, la phrase est vraie.</a:t>
+              <a:t>For </a:t>
+            </a:r>
+            <a:r>
+              <a:rPr lang="fr-FR" dirty="0" err="1" smtClean="0"/>
+              <a:t>each</a:t>
+            </a:r>
+            <a:r>
+              <a:rPr lang="fr-FR" dirty="0" smtClean="0"/>
+              <a:t> item, </a:t>
+            </a:r>
+            <a:r>
+              <a:rPr lang="fr-FR" dirty="0" err="1"/>
+              <a:t>y</a:t>
+            </a:r>
+            <a:r>
+              <a:rPr lang="fr-FR" dirty="0" err="1" smtClean="0"/>
+              <a:t>our</a:t>
+            </a:r>
+            <a:r>
+              <a:rPr lang="fr-FR" dirty="0" smtClean="0"/>
+              <a:t> </a:t>
+            </a:r>
+            <a:r>
+              <a:rPr lang="fr-FR" dirty="0" err="1" smtClean="0"/>
+              <a:t>task</a:t>
+            </a:r>
+            <a:r>
+              <a:rPr lang="fr-FR" dirty="0" smtClean="0"/>
+              <a:t> </a:t>
+            </a:r>
+            <a:r>
+              <a:rPr lang="fr-FR" dirty="0" err="1" smtClean="0"/>
+              <a:t>is</a:t>
+            </a:r>
+            <a:r>
+              <a:rPr lang="fr-FR" dirty="0" smtClean="0"/>
+              <a:t> to tell us </a:t>
+            </a:r>
+            <a:r>
+              <a:rPr lang="fr-FR" dirty="0" err="1" smtClean="0"/>
+              <a:t>whether</a:t>
+            </a:r>
+            <a:r>
+              <a:rPr lang="fr-FR" dirty="0" smtClean="0"/>
+              <a:t> the senten</a:t>
+            </a:r>
+            <a:r>
+              <a:rPr lang="fr-FR" dirty="0" smtClean="0"/>
+              <a:t>ce </a:t>
+            </a:r>
+            <a:r>
+              <a:rPr lang="fr-FR" dirty="0" err="1" smtClean="0"/>
+              <a:t>is</a:t>
+            </a:r>
+            <a:r>
+              <a:rPr lang="fr-FR" dirty="0" smtClean="0"/>
+              <a:t> </a:t>
+            </a:r>
+            <a:r>
+              <a:rPr lang="fr-FR" dirty="0" err="1" smtClean="0"/>
+              <a:t>true</a:t>
+            </a:r>
+            <a:r>
+              <a:rPr lang="fr-FR" dirty="0" smtClean="0"/>
+              <a:t> or false of the </a:t>
+            </a:r>
+            <a:r>
+              <a:rPr lang="fr-FR" dirty="0" err="1" smtClean="0"/>
+              <a:t>picture</a:t>
+            </a:r>
+            <a:r>
+              <a:rPr lang="fr-FR" dirty="0" smtClean="0"/>
+              <a:t> </a:t>
+            </a:r>
+            <a:r>
+              <a:rPr lang="fr-FR" dirty="0" err="1" smtClean="0"/>
+              <a:t>it</a:t>
+            </a:r>
+            <a:r>
+              <a:rPr lang="fr-FR" dirty="0" smtClean="0"/>
+              <a:t> </a:t>
+            </a:r>
+            <a:r>
+              <a:rPr lang="fr-FR" dirty="0" err="1" smtClean="0"/>
+              <a:t>is</a:t>
+            </a:r>
+            <a:r>
+              <a:rPr lang="fr-FR" dirty="0" smtClean="0"/>
+              <a:t> </a:t>
+            </a:r>
+            <a:r>
+              <a:rPr lang="fr-FR" dirty="0" err="1" smtClean="0"/>
+              <a:t>paired</a:t>
+            </a:r>
+            <a:r>
+              <a:rPr lang="fr-FR" dirty="0" smtClean="0"/>
+              <a:t> </a:t>
+            </a:r>
+            <a:r>
+              <a:rPr lang="fr-FR" dirty="0" err="1" smtClean="0"/>
+              <a:t>with</a:t>
+            </a:r>
+            <a:r>
+              <a:rPr lang="fr-FR" dirty="0" smtClean="0"/>
+              <a:t>. For instance, in the </a:t>
+            </a:r>
+            <a:r>
+              <a:rPr lang="fr-FR" dirty="0" err="1" smtClean="0"/>
+              <a:t>example</a:t>
+            </a:r>
+            <a:r>
+              <a:rPr lang="fr-FR" dirty="0" smtClean="0"/>
+              <a:t> </a:t>
+            </a:r>
+            <a:r>
+              <a:rPr lang="fr-FR" dirty="0" err="1" smtClean="0"/>
+              <a:t>above</a:t>
+            </a:r>
+            <a:r>
+              <a:rPr lang="fr-FR" dirty="0" smtClean="0"/>
+              <a:t>, the sentence </a:t>
+            </a:r>
+            <a:r>
+              <a:rPr lang="fr-FR" dirty="0" err="1" smtClean="0"/>
+              <a:t>is</a:t>
+            </a:r>
+            <a:r>
+              <a:rPr lang="fr-FR" dirty="0" smtClean="0"/>
+              <a:t> </a:t>
+            </a:r>
+            <a:r>
+              <a:rPr lang="fr-FR" dirty="0" err="1" smtClean="0"/>
+              <a:t>true</a:t>
+            </a:r>
+            <a:r>
+              <a:rPr lang="fr-FR" dirty="0" smtClean="0"/>
+              <a:t>.</a:t>
+            </a:r>
+            <a:endParaRPr lang="fr-FR" dirty="0" smtClean="0"/>
+          </a:p>
+          <a:p>
+            <a:pPr algn="just"/>
+            <a:endParaRPr lang="en-US" sz="400" dirty="0" smtClean="0"/>
+          </a:p>
+          <a:p>
+            <a:pPr algn="just"/>
+            <a:r>
+              <a:rPr lang="fr-FR" b="1" dirty="0" smtClean="0"/>
+              <a:t>Important</a:t>
+            </a:r>
+            <a:r>
+              <a:rPr lang="fr-FR" b="1" dirty="0" smtClean="0"/>
+              <a:t>: </a:t>
+            </a:r>
+            <a:r>
+              <a:rPr lang="fr-FR" b="1" dirty="0" err="1" smtClean="0"/>
+              <a:t>this</a:t>
+            </a:r>
+            <a:r>
+              <a:rPr lang="fr-FR" b="1" dirty="0" smtClean="0"/>
+              <a:t> </a:t>
+            </a:r>
+            <a:r>
+              <a:rPr lang="fr-FR" b="1" dirty="0" err="1" smtClean="0"/>
+              <a:t>is</a:t>
+            </a:r>
+            <a:r>
+              <a:rPr lang="fr-FR" b="1" dirty="0" smtClean="0"/>
+              <a:t> not a math test! </a:t>
+            </a:r>
+            <a:r>
+              <a:rPr lang="fr-FR" dirty="0" smtClean="0"/>
+              <a:t>In </a:t>
+            </a:r>
+            <a:r>
+              <a:rPr lang="en-GB" dirty="0" smtClean="0"/>
+              <a:t>fact</a:t>
+            </a:r>
+            <a:r>
+              <a:rPr lang="fr-FR" dirty="0" smtClean="0"/>
+              <a:t>, in </a:t>
+            </a:r>
+            <a:r>
+              <a:rPr lang="fr-FR" dirty="0" err="1" smtClean="0"/>
+              <a:t>many</a:t>
+            </a:r>
+            <a:r>
+              <a:rPr lang="fr-FR" dirty="0" smtClean="0"/>
+              <a:t> cases, the sentence </a:t>
+            </a:r>
+            <a:r>
+              <a:rPr lang="fr-FR" dirty="0" err="1" smtClean="0"/>
+              <a:t>might</a:t>
+            </a:r>
+            <a:r>
+              <a:rPr lang="fr-FR" dirty="0" smtClean="0"/>
+              <a:t> not </a:t>
+            </a:r>
+            <a:r>
+              <a:rPr lang="fr-FR" dirty="0" err="1" smtClean="0"/>
+              <a:t>be</a:t>
+            </a:r>
+            <a:r>
+              <a:rPr lang="fr-FR" dirty="0" smtClean="0"/>
+              <a:t> </a:t>
+            </a:r>
+            <a:r>
+              <a:rPr lang="fr-FR" dirty="0" err="1" smtClean="0"/>
+              <a:t>clearly</a:t>
+            </a:r>
+            <a:r>
+              <a:rPr lang="fr-FR" dirty="0" smtClean="0"/>
+              <a:t> </a:t>
+            </a:r>
+            <a:r>
+              <a:rPr lang="fr-FR" dirty="0" err="1" smtClean="0"/>
+              <a:t>true</a:t>
+            </a:r>
+            <a:r>
+              <a:rPr lang="fr-FR" dirty="0" smtClean="0"/>
+              <a:t> or </a:t>
+            </a:r>
+            <a:r>
+              <a:rPr lang="fr-FR" dirty="0" err="1" smtClean="0"/>
+              <a:t>clearly</a:t>
+            </a:r>
+            <a:r>
+              <a:rPr lang="fr-FR" dirty="0" smtClean="0"/>
+              <a:t> false, but </a:t>
+            </a:r>
+            <a:r>
+              <a:rPr lang="fr-FR" dirty="0" err="1" smtClean="0"/>
+              <a:t>describes</a:t>
+            </a:r>
+            <a:r>
+              <a:rPr lang="fr-FR" dirty="0" smtClean="0"/>
+              <a:t> the </a:t>
+            </a:r>
+            <a:r>
+              <a:rPr lang="fr-FR" dirty="0" err="1" smtClean="0"/>
+              <a:t>picture</a:t>
+            </a:r>
+            <a:r>
+              <a:rPr lang="fr-FR" dirty="0" smtClean="0"/>
+              <a:t> more or </a:t>
+            </a:r>
+            <a:r>
+              <a:rPr lang="fr-FR" dirty="0" err="1" smtClean="0"/>
+              <a:t>less</a:t>
+            </a:r>
+            <a:r>
+              <a:rPr lang="fr-FR" dirty="0" smtClean="0"/>
+              <a:t> </a:t>
+            </a:r>
+            <a:r>
+              <a:rPr lang="fr-FR" dirty="0" err="1" smtClean="0"/>
+              <a:t>well</a:t>
+            </a:r>
+            <a:r>
+              <a:rPr lang="fr-FR" dirty="0" smtClean="0"/>
+              <a:t>. </a:t>
+            </a:r>
+            <a:r>
+              <a:rPr lang="fr-FR" dirty="0" smtClean="0"/>
+              <a:t>For </a:t>
+            </a:r>
+            <a:r>
+              <a:rPr lang="fr-FR" dirty="0" err="1" smtClean="0"/>
+              <a:t>this</a:t>
+            </a:r>
+            <a:r>
+              <a:rPr lang="fr-FR" dirty="0" smtClean="0"/>
+              <a:t> </a:t>
+            </a:r>
+            <a:r>
+              <a:rPr lang="fr-FR" dirty="0" err="1" smtClean="0"/>
+              <a:t>reason</a:t>
+            </a:r>
+            <a:r>
+              <a:rPr lang="fr-FR" dirty="0" smtClean="0"/>
+              <a:t>, </a:t>
+            </a:r>
+            <a:r>
+              <a:rPr lang="fr-FR" dirty="0" err="1" smtClean="0"/>
+              <a:t>you</a:t>
+            </a:r>
+            <a:r>
+              <a:rPr lang="fr-FR" dirty="0" smtClean="0"/>
+              <a:t> </a:t>
+            </a:r>
+            <a:r>
+              <a:rPr lang="fr-FR" dirty="0" err="1" smtClean="0"/>
+              <a:t>will</a:t>
+            </a:r>
+            <a:r>
+              <a:rPr lang="fr-FR" dirty="0" smtClean="0"/>
+              <a:t> </a:t>
+            </a:r>
+            <a:r>
+              <a:rPr lang="fr-FR" dirty="0" err="1" smtClean="0"/>
+              <a:t>be</a:t>
+            </a:r>
+            <a:r>
+              <a:rPr lang="fr-FR" dirty="0" smtClean="0"/>
+              <a:t> able to </a:t>
+            </a:r>
+            <a:r>
+              <a:rPr lang="fr-FR" dirty="0" err="1" smtClean="0"/>
+              <a:t>give</a:t>
+            </a:r>
+            <a:r>
+              <a:rPr lang="fr-FR" dirty="0" smtClean="0"/>
+              <a:t> a </a:t>
+            </a:r>
+            <a:r>
+              <a:rPr lang="fr-FR" dirty="0" err="1" smtClean="0"/>
+              <a:t>finer</a:t>
+            </a:r>
+            <a:r>
+              <a:rPr lang="fr-FR" dirty="0" smtClean="0"/>
+              <a:t> </a:t>
+            </a:r>
+            <a:r>
+              <a:rPr lang="fr-FR" dirty="0" err="1" smtClean="0"/>
+              <a:t>jugdment</a:t>
+            </a:r>
+            <a:r>
+              <a:rPr lang="fr-FR" dirty="0" smtClean="0"/>
+              <a:t> </a:t>
+            </a:r>
+            <a:r>
+              <a:rPr lang="fr-FR" dirty="0" err="1" smtClean="0"/>
+              <a:t>than</a:t>
+            </a:r>
+            <a:r>
+              <a:rPr lang="fr-FR" dirty="0" smtClean="0"/>
+              <a:t> a simple ‘</a:t>
+            </a:r>
+            <a:r>
+              <a:rPr lang="fr-FR" dirty="0" err="1"/>
+              <a:t>T</a:t>
+            </a:r>
+            <a:r>
+              <a:rPr lang="fr-FR" dirty="0" err="1" smtClean="0"/>
+              <a:t>rue</a:t>
+            </a:r>
+            <a:r>
+              <a:rPr lang="fr-FR" dirty="0" smtClean="0"/>
+              <a:t>’ or ‘False’: </a:t>
+            </a:r>
+            <a:r>
+              <a:rPr lang="fr-FR" dirty="0" err="1" smtClean="0"/>
+              <a:t>you</a:t>
+            </a:r>
+            <a:r>
+              <a:rPr lang="fr-FR" dirty="0" smtClean="0"/>
+              <a:t> </a:t>
+            </a:r>
+            <a:r>
+              <a:rPr lang="fr-FR" dirty="0" err="1" smtClean="0"/>
+              <a:t>will</a:t>
+            </a:r>
+            <a:r>
+              <a:rPr lang="fr-FR" dirty="0" smtClean="0"/>
+              <a:t> </a:t>
+            </a:r>
+            <a:r>
+              <a:rPr lang="fr-FR" dirty="0" err="1" smtClean="0"/>
+              <a:t>give</a:t>
+            </a:r>
+            <a:r>
+              <a:rPr lang="fr-FR" dirty="0" smtClean="0"/>
+              <a:t> </a:t>
+            </a:r>
+            <a:r>
+              <a:rPr lang="fr-FR" dirty="0" err="1" smtClean="0"/>
+              <a:t>your</a:t>
+            </a:r>
+            <a:r>
+              <a:rPr lang="fr-FR" dirty="0" smtClean="0"/>
+              <a:t> </a:t>
+            </a:r>
+            <a:r>
+              <a:rPr lang="fr-FR" dirty="0" err="1" smtClean="0"/>
+              <a:t>answer</a:t>
+            </a:r>
+            <a:r>
+              <a:rPr lang="fr-FR" dirty="0"/>
+              <a:t> </a:t>
+            </a:r>
+            <a:r>
+              <a:rPr lang="fr-FR" dirty="0" err="1" smtClean="0"/>
+              <a:t>along</a:t>
+            </a:r>
+            <a:r>
+              <a:rPr lang="fr-FR" dirty="0" smtClean="0"/>
+              <a:t> </a:t>
+            </a:r>
+            <a:r>
+              <a:rPr lang="fr-FR" dirty="0"/>
+              <a:t>a continuum of </a:t>
+            </a:r>
+            <a:r>
+              <a:rPr lang="fr-FR" dirty="0" err="1"/>
+              <a:t>answers</a:t>
+            </a:r>
+            <a:r>
+              <a:rPr lang="fr-FR" dirty="0"/>
+              <a:t>, by setting </a:t>
+            </a:r>
+            <a:r>
+              <a:rPr lang="fr-FR" dirty="0" err="1"/>
+              <a:t>with</a:t>
+            </a:r>
+            <a:r>
+              <a:rPr lang="fr-FR" dirty="0"/>
+              <a:t> </a:t>
+            </a:r>
+            <a:r>
+              <a:rPr lang="fr-FR" dirty="0" smtClean="0"/>
+              <a:t>the </a:t>
+            </a:r>
+            <a:r>
+              <a:rPr lang="fr-FR" dirty="0" err="1"/>
+              <a:t>cursor</a:t>
+            </a:r>
+            <a:r>
+              <a:rPr lang="fr-FR" dirty="0"/>
+              <a:t> the right end of a </a:t>
+            </a:r>
+            <a:r>
+              <a:rPr lang="fr-FR" dirty="0" err="1"/>
+              <a:t>red</a:t>
+            </a:r>
+            <a:r>
+              <a:rPr lang="fr-FR" dirty="0"/>
+              <a:t> line </a:t>
+            </a:r>
+            <a:r>
+              <a:rPr lang="fr-FR" dirty="0" err="1"/>
+              <a:t>going</a:t>
+            </a:r>
+            <a:r>
+              <a:rPr lang="fr-FR" dirty="0"/>
+              <a:t> </a:t>
+            </a:r>
+            <a:r>
+              <a:rPr lang="fr-FR" dirty="0" err="1"/>
+              <a:t>between</a:t>
+            </a:r>
+            <a:r>
+              <a:rPr lang="fr-FR" dirty="0"/>
+              <a:t> </a:t>
+            </a:r>
+            <a:r>
+              <a:rPr lang="fr-FR" dirty="0" smtClean="0"/>
+              <a:t>‘False’ </a:t>
+            </a:r>
+            <a:r>
+              <a:rPr lang="fr-FR" dirty="0"/>
+              <a:t>(to the </a:t>
+            </a:r>
+            <a:r>
+              <a:rPr lang="fr-FR" dirty="0" err="1"/>
+              <a:t>left</a:t>
+            </a:r>
+            <a:r>
+              <a:rPr lang="fr-FR" dirty="0"/>
+              <a:t>) to </a:t>
+            </a:r>
+            <a:r>
+              <a:rPr lang="fr-FR" dirty="0" smtClean="0"/>
+              <a:t>‘</a:t>
+            </a:r>
+            <a:r>
+              <a:rPr lang="fr-FR" dirty="0" err="1" smtClean="0"/>
+              <a:t>True</a:t>
+            </a:r>
+            <a:r>
+              <a:rPr lang="fr-FR" dirty="0" smtClean="0"/>
+              <a:t>’ </a:t>
+            </a:r>
+            <a:r>
+              <a:rPr lang="fr-FR" dirty="0"/>
+              <a:t>(to the right</a:t>
+            </a:r>
+            <a:r>
+              <a:rPr lang="fr-FR" dirty="0" smtClean="0"/>
+              <a:t>). The more the sentence </a:t>
+            </a:r>
+            <a:r>
+              <a:rPr lang="fr-FR" dirty="0" err="1" smtClean="0"/>
+              <a:t>will</a:t>
+            </a:r>
+            <a:r>
+              <a:rPr lang="fr-FR" dirty="0" smtClean="0"/>
+              <a:t> </a:t>
+            </a:r>
+            <a:r>
+              <a:rPr lang="fr-FR" dirty="0" err="1" smtClean="0"/>
+              <a:t>seem</a:t>
+            </a:r>
+            <a:r>
+              <a:rPr lang="fr-FR" dirty="0" smtClean="0"/>
+              <a:t> to </a:t>
+            </a:r>
+            <a:r>
+              <a:rPr lang="fr-FR" dirty="0" err="1" smtClean="0"/>
+              <a:t>be</a:t>
+            </a:r>
+            <a:r>
+              <a:rPr lang="fr-FR" dirty="0" smtClean="0"/>
+              <a:t> a good description of the </a:t>
+            </a:r>
+            <a:r>
+              <a:rPr lang="fr-FR" dirty="0" err="1" smtClean="0"/>
+              <a:t>picture</a:t>
+            </a:r>
+            <a:r>
+              <a:rPr lang="fr-FR" dirty="0" smtClean="0"/>
+              <a:t>, the more </a:t>
+            </a:r>
+            <a:r>
+              <a:rPr lang="fr-FR" dirty="0" err="1" smtClean="0"/>
+              <a:t>you</a:t>
+            </a:r>
+            <a:r>
+              <a:rPr lang="fr-FR" dirty="0" smtClean="0"/>
+              <a:t> </a:t>
+            </a:r>
+            <a:r>
+              <a:rPr lang="fr-FR" dirty="0" err="1" smtClean="0"/>
+              <a:t>will</a:t>
+            </a:r>
+            <a:r>
+              <a:rPr lang="fr-FR" dirty="0" smtClean="0"/>
+              <a:t> move the end of the </a:t>
+            </a:r>
+            <a:r>
+              <a:rPr lang="fr-FR" dirty="0" err="1" smtClean="0"/>
+              <a:t>red</a:t>
+            </a:r>
+            <a:r>
+              <a:rPr lang="fr-FR" dirty="0" smtClean="0"/>
+              <a:t> line to ‘</a:t>
+            </a:r>
+            <a:r>
+              <a:rPr lang="fr-FR" dirty="0" err="1" smtClean="0"/>
+              <a:t>True</a:t>
+            </a:r>
+            <a:r>
+              <a:rPr lang="fr-FR" dirty="0" smtClean="0"/>
+              <a:t>’. It </a:t>
+            </a:r>
+            <a:r>
+              <a:rPr lang="fr-FR" dirty="0" err="1" smtClean="0"/>
+              <a:t>should</a:t>
+            </a:r>
+            <a:r>
+              <a:rPr lang="fr-FR" dirty="0" smtClean="0"/>
+              <a:t> </a:t>
+            </a:r>
+            <a:r>
+              <a:rPr lang="fr-FR" dirty="0" err="1" smtClean="0"/>
+              <a:t>be</a:t>
+            </a:r>
+            <a:r>
+              <a:rPr lang="fr-FR" dirty="0" smtClean="0"/>
+              <a:t> the case for an </a:t>
+            </a:r>
+            <a:r>
+              <a:rPr lang="fr-FR" dirty="0" err="1" smtClean="0"/>
+              <a:t>example</a:t>
+            </a:r>
+            <a:r>
+              <a:rPr lang="fr-FR" dirty="0" smtClean="0"/>
+              <a:t> </a:t>
+            </a:r>
+            <a:r>
+              <a:rPr lang="fr-FR" dirty="0" err="1" smtClean="0"/>
+              <a:t>like</a:t>
+            </a:r>
+            <a:r>
+              <a:rPr lang="fr-FR" dirty="0" smtClean="0"/>
+              <a:t> the one </a:t>
+            </a:r>
+            <a:r>
+              <a:rPr lang="fr-FR" dirty="0" err="1" smtClean="0"/>
+              <a:t>above</a:t>
+            </a:r>
+            <a:r>
+              <a:rPr lang="fr-FR" dirty="0" smtClean="0"/>
+              <a:t>, and </a:t>
+            </a:r>
+            <a:r>
+              <a:rPr lang="fr-FR" dirty="0" err="1" smtClean="0"/>
+              <a:t>thus</a:t>
+            </a:r>
+            <a:r>
+              <a:rPr lang="fr-FR" dirty="0" smtClean="0"/>
+              <a:t> </a:t>
+            </a:r>
+            <a:r>
+              <a:rPr lang="fr-FR" dirty="0" err="1" smtClean="0"/>
+              <a:t>your</a:t>
+            </a:r>
+            <a:r>
+              <a:rPr lang="fr-FR" dirty="0" smtClean="0"/>
+              <a:t> </a:t>
+            </a:r>
+            <a:r>
+              <a:rPr lang="fr-FR" dirty="0" err="1" smtClean="0"/>
+              <a:t>answer</a:t>
+            </a:r>
+            <a:r>
+              <a:rPr lang="fr-FR" dirty="0" smtClean="0"/>
+              <a:t> </a:t>
+            </a:r>
+            <a:r>
+              <a:rPr lang="fr-FR" dirty="0" err="1" smtClean="0"/>
+              <a:t>should</a:t>
+            </a:r>
+            <a:r>
+              <a:rPr lang="fr-FR" dirty="0" smtClean="0"/>
+              <a:t> look </a:t>
+            </a:r>
+            <a:r>
+              <a:rPr lang="fr-FR" dirty="0" err="1" smtClean="0"/>
+              <a:t>like</a:t>
+            </a:r>
+            <a:r>
+              <a:rPr lang="fr-FR" dirty="0" smtClean="0"/>
+              <a:t> </a:t>
+            </a:r>
+            <a:r>
+              <a:rPr lang="fr-FR" dirty="0" err="1" smtClean="0"/>
+              <a:t>what</a:t>
+            </a:r>
+            <a:r>
+              <a:rPr lang="fr-FR" dirty="0" smtClean="0"/>
+              <a:t> </a:t>
+            </a:r>
+            <a:r>
+              <a:rPr lang="fr-FR" dirty="0" err="1" smtClean="0"/>
+              <a:t>you</a:t>
+            </a:r>
+            <a:r>
+              <a:rPr lang="fr-FR" dirty="0" smtClean="0"/>
+              <a:t> </a:t>
+            </a:r>
+            <a:r>
+              <a:rPr lang="fr-FR" dirty="0" err="1" smtClean="0"/>
+              <a:t>see</a:t>
+            </a:r>
+            <a:r>
+              <a:rPr lang="fr-FR" dirty="0" smtClean="0"/>
+              <a:t>. </a:t>
+            </a:r>
+            <a:r>
+              <a:rPr lang="fr-FR" dirty="0" err="1" smtClean="0"/>
+              <a:t>Conversely</a:t>
+            </a:r>
+            <a:r>
+              <a:rPr lang="fr-FR" dirty="0" smtClean="0"/>
+              <a:t>, if the sentence </a:t>
+            </a:r>
+            <a:r>
+              <a:rPr lang="fr-FR" dirty="0" err="1" smtClean="0"/>
+              <a:t>sounds</a:t>
+            </a:r>
+            <a:r>
+              <a:rPr lang="fr-FR" dirty="0" smtClean="0"/>
+              <a:t> </a:t>
+            </a:r>
+            <a:r>
+              <a:rPr lang="fr-FR" dirty="0" err="1" smtClean="0"/>
+              <a:t>rather</a:t>
+            </a:r>
+            <a:r>
+              <a:rPr lang="fr-FR" dirty="0" smtClean="0"/>
+              <a:t> </a:t>
+            </a:r>
+            <a:r>
+              <a:rPr lang="fr-FR" dirty="0" err="1" smtClean="0"/>
+              <a:t>inappropriate</a:t>
+            </a:r>
+            <a:r>
+              <a:rPr lang="fr-FR" dirty="0" smtClean="0"/>
+              <a:t>, </a:t>
+            </a:r>
+            <a:r>
+              <a:rPr lang="fr-FR" dirty="0" err="1" smtClean="0"/>
+              <a:t>you</a:t>
+            </a:r>
+            <a:r>
+              <a:rPr lang="fr-FR" dirty="0" smtClean="0"/>
+              <a:t> </a:t>
+            </a:r>
+            <a:r>
+              <a:rPr lang="fr-FR" dirty="0" err="1" smtClean="0"/>
+              <a:t>will</a:t>
+            </a:r>
+            <a:r>
+              <a:rPr lang="fr-FR" dirty="0" smtClean="0"/>
+              <a:t> move the </a:t>
+            </a:r>
+            <a:r>
+              <a:rPr lang="fr-FR" dirty="0" err="1" smtClean="0"/>
+              <a:t>red</a:t>
+            </a:r>
+            <a:r>
+              <a:rPr lang="fr-FR" dirty="0" smtClean="0"/>
+              <a:t> line to the </a:t>
+            </a:r>
+            <a:r>
+              <a:rPr lang="fr-FR" dirty="0" err="1" smtClean="0"/>
+              <a:t>left</a:t>
+            </a:r>
+            <a:r>
+              <a:rPr lang="fr-FR" dirty="0" smtClean="0"/>
+              <a:t>, </a:t>
+            </a:r>
+            <a:r>
+              <a:rPr lang="fr-FR" dirty="0" err="1" smtClean="0"/>
+              <a:t>that</a:t>
+            </a:r>
+            <a:r>
+              <a:rPr lang="fr-FR" dirty="0" smtClean="0"/>
+              <a:t> </a:t>
+            </a:r>
+            <a:r>
+              <a:rPr lang="fr-FR" dirty="0" err="1" smtClean="0"/>
+              <a:t>is</a:t>
+            </a:r>
+            <a:r>
+              <a:rPr lang="fr-FR" dirty="0" smtClean="0"/>
+              <a:t> to ‘False’. </a:t>
             </a:r>
           </a:p>
           <a:p>
@@ -3763,59 +4919,32 @@
             <a:endParaRPr lang="fr-FR" sz="1000" dirty="0" smtClean="0"/>
           </a:p>
           <a:p>
-            <a:pPr algn="just"/>
-            <a:r>
-              <a:rPr lang="fr-FR" b="1" dirty="0" smtClean="0"/>
-              <a:t>Important: ceci n’est pas un test de maths! </a:t>
-            </a:r>
-            <a:r>
-              <a:rPr lang="fr-FR" dirty="0" smtClean="0"/>
-              <a:t>En réalité, dans de nombreux cas que vous allez voir, la phrase ne sera pas clairement vraie ou clairement fausse, mais elle décrira plus ou moins bien la situation. Il n’y a donc pas de bonne réponse mais seulement </a:t>
-            </a:r>
-            <a:r>
-              <a:rPr lang="fr-FR" b="1" dirty="0" smtClean="0"/>
-              <a:t>votre intuition. </a:t>
-            </a:r>
-            <a:r>
-              <a:rPr lang="fr-FR" dirty="0" smtClean="0"/>
-              <a:t>Pour cela, vous pourrez donner un jugement plus fin qu’un simple “oui” ou “non”: vous donnerez vos réponses en fixant la longueur d’une ligne rouge sur une ligne allant de “Non” `a “Oui”. Plus la phrase vous semble vraie/appropriée, plus vous amènerez la barre vers la droite avec la souris, près de “Oui”. Ce sera sans doute le cas avec un exemple comme ci-dessus et votre réponse ressemblera donc à ce qui était représentée. A l’inverse, si la phrase vous semble plutôt inappropriée, vous déplacerez l’</a:t>
-            </a:r>
-            <a:r>
-              <a:rPr lang="fr-FR" dirty="0" err="1" smtClean="0"/>
-              <a:t>extrêmité</a:t>
-            </a:r>
-            <a:r>
-              <a:rPr lang="fr-FR" dirty="0" smtClean="0"/>
-              <a:t> de la </a:t>
-            </a:r>
-            <a:r>
-              <a:rPr lang="en-GB" dirty="0" err="1" smtClean="0"/>
-              <a:t>barre</a:t>
-            </a:r>
-            <a:r>
-              <a:rPr lang="en-GB" dirty="0" smtClean="0"/>
-              <a:t> </a:t>
-            </a:r>
-            <a:r>
-              <a:rPr lang="en-GB" dirty="0" err="1" smtClean="0"/>
-              <a:t>vers</a:t>
-            </a:r>
-            <a:r>
-              <a:rPr lang="en-GB" dirty="0" smtClean="0"/>
-              <a:t> la gauche.</a:t>
-            </a:r>
-          </a:p>
-          <a:p>
-            <a:pPr algn="just"/>
-            <a:endParaRPr lang="fr-FR" sz="1000" dirty="0" smtClean="0"/>
-          </a:p>
-          <a:p>
             <a:pPr algn="r"/>
             <a:r>
-              <a:rPr lang="fr-FR" sz="1700" i="1" dirty="0" smtClean="0"/>
-              <a:t>Appuyer sur ESPACE pour lire la suite des instructions…</a:t>
-            </a:r>
-            <a:endParaRPr lang="en-GB" sz="1700" i="1" dirty="0" smtClean="0"/>
+              <a:rPr lang="fr-FR" sz="2000" i="1" dirty="0" err="1" smtClean="0"/>
+              <a:t>Press</a:t>
+            </a:r>
+            <a:r>
+              <a:rPr lang="fr-FR" sz="2000" i="1" dirty="0" smtClean="0"/>
+              <a:t> SPACEBAR to </a:t>
+            </a:r>
+            <a:r>
+              <a:rPr lang="fr-FR" sz="2000" i="1" dirty="0" err="1" smtClean="0"/>
+              <a:t>read</a:t>
+            </a:r>
+            <a:r>
+              <a:rPr lang="fr-FR" sz="2000" i="1" dirty="0" smtClean="0"/>
+              <a:t> the </a:t>
+            </a:r>
+            <a:r>
+              <a:rPr lang="fr-FR" sz="2000" i="1" dirty="0" err="1" smtClean="0"/>
+              <a:t>rest</a:t>
+            </a:r>
+            <a:r>
+              <a:rPr lang="fr-FR" sz="2000" i="1" dirty="0" smtClean="0"/>
+              <a:t> of the instructions…</a:t>
+            </a:r>
+            <a:endParaRPr lang="en-GB" sz="2000" i="1" dirty="0" smtClean="0"/>
           </a:p>
           <a:p>
             <a:pPr algn="just"/>
@@ -3829,44 +4958,95 @@
       </p:sp>
       <p:pic>
         <p:nvPicPr>
-          <p:cNvPr id="1027" name="Picture 3"/>
+          <p:cNvPr id="7" name="Picture 6"/>
           <p:cNvPicPr>
-            <a:picLocks noChangeAspect="1" noChangeArrowheads="1"/>
+            <a:picLocks noChangeAspect="1"/>
           </p:cNvPicPr>
           <p:nvPr/>
         </p:nvPicPr>
         <p:blipFill>
-          <a:blip r:embed="rId2" cstate="print"/>
-          <a:srcRect l="31297" t="23750" r="31297" b="17188"/>
+          <a:blip r:embed="rId2"/>
           <a:stretch>
             <a:fillRect/>
           </a:stretch>
         </p:blipFill>
-        <p:spPr bwMode="auto">
+        <p:spPr>
           <a:xfrm>
-            <a:off x="3347864" y="908720"/>
-            <a:ext cx="2376264" cy="2376264"/>
+            <a:off x="3419872" y="1124744"/>
+            <a:ext cx="1943363" cy="2088232"/>
           </a:xfrm>
           <a:prstGeom prst="rect">
             <a:avLst/>
           </a:prstGeom>
-          <a:ln>
-            <a:noFill/>
+          <a:solidFill>
+            <a:srgbClr val="FFFFFF">
+              <a:shade val="85000"/>
+            </a:srgbClr>
+          </a:solidFill>
+          <a:ln w="190500" cap="rnd">
+            <a:solidFill>
+              <a:srgbClr val="FFFFFF"/>
+            </a:solidFill>
           </a:ln>
           <a:effectLst>
-            <a:outerShdw blurRad="292100" dist="139700" dir="2700000" algn="tl" rotWithShape="0">
-              <a:srgbClr val="333333">
-                <a:alpha val="65000"/>
+            <a:outerShdw blurRad="50000" algn="tl" rotWithShape="0">
+              <a:srgbClr val="000000">
+                <a:alpha val="41000"/>
               </a:srgbClr>
             </a:outerShdw>
           </a:effectLst>
+          <a:scene3d>
+            <a:camera prst="orthographicFront"/>
+            <a:lightRig rig="twoPt" dir="t">
+              <a:rot lat="0" lon="0" rev="7800000"/>
+            </a:lightRig>
+          </a:scene3d>
+          <a:sp3d contourW="6350">
+            <a:bevelT w="50800" h="16510"/>
+            <a:contourClr>
+              <a:srgbClr val="C0C0C0"/>
+            </a:contourClr>
+          </a:sp3d>
         </p:spPr>
       </p:pic>
+      <p:sp>
+        <p:nvSpPr>
+          <p:cNvPr id="2" name="TextBox 1"/>
+          <p:cNvSpPr txBox="1"/>
+          <p:nvPr/>
+        </p:nvSpPr>
+        <p:spPr>
+          <a:xfrm>
+            <a:off x="7256589" y="2260994"/>
+            <a:ext cx="184666" cy="369332"/>
+          </a:xfrm>
+          <a:prstGeom prst="rect">
+            <a:avLst/>
+          </a:prstGeom>
+          <a:noFill/>
+        </p:spPr>
+        <p:txBody>
+          <a:bodyPr wrap="none" rtlCol="0">
+            <a:spAutoFit/>
+          </a:bodyPr>
+          <a:lstStyle/>
+          <a:p>
+            <a:endParaRPr lang="en-US" dirty="0"/>
+          </a:p>
+        </p:txBody>
+      </p:sp>
     </p:spTree>
   </p:cSld>
   <p:clrMapOvr>
     <a:masterClrMapping/>
   </p:clrMapOvr>
+  <p:timing>
+    <p:tnLst>
+      <p:par>
+        <p:cTn xmlns:p14="http://schemas.microsoft.com/office/powerpoint/2010/main" id="1" dur="indefinite" restart="never" nodeType="tmRoot"/>
+      </p:par>
+    </p:tnLst>
+  </p:timing>
 </p:sld>
 </file>
 
@@ -3896,7 +5076,7 @@
         <p:spPr>
           <a:xfrm>
             <a:off x="107504" y="0"/>
-            <a:ext cx="8928992" cy="6370975"/>
+            <a:ext cx="8928992" cy="5724645"/>
           </a:xfrm>
           <a:prstGeom prst="rect">
             <a:avLst/>
@@ -3918,9 +5098,10 @@
           </a:p>
           <a:p>
             <a:r>
-              <a:rPr lang="en-GB" i="1" dirty="0" smtClean="0"/>
-              <a:t>En résumé</a:t>
-            </a:r>
+              <a:rPr lang="en-GB" sz="2000" i="1" dirty="0" smtClean="0"/>
+              <a:t>To summarize</a:t>
+            </a:r>
+            <a:endParaRPr lang="en-GB" sz="2000" i="1" dirty="0" smtClean="0"/>
           </a:p>
           <a:p>
             <a:pPr algn="just"/>
@@ -3930,44 +5111,20 @@
             <a:pPr algn="just"/>
             <a:r>
               <a:rPr lang="en-GB" dirty="0" smtClean="0"/>
-              <a:t>Il se </a:t>
-            </a:r>
-            <a:r>
-              <a:rPr lang="en-GB" dirty="0" err="1" smtClean="0"/>
-              <a:t>peut</a:t>
+              <a:t>You might hesitate, but follow your </a:t>
             </a:r>
             <a:r>
               <a:rPr lang="en-GB" dirty="0" smtClean="0"/>
-              <a:t> </a:t>
-            </a:r>
-            <a:r>
-              <a:rPr lang="fr-FR" dirty="0" smtClean="0"/>
-              <a:t>que vous hésitiez, mais suivez votre sentiment et utilisez la flexibilité de la barre rouge pour représenter au plus juste votre intuition sur l’adéquation entre la phrase et la situation. Ne cherchez pas particulièrement à justifier votre réponse ou à comprendre d’où peut venir votre intuition: </a:t>
-            </a:r>
-            <a:r>
-              <a:rPr lang="fr-FR" b="1" dirty="0" smtClean="0"/>
-              <a:t>répondez comme il vous </a:t>
-            </a:r>
-            <a:r>
-              <a:rPr lang="en-GB" b="1" dirty="0" err="1" smtClean="0"/>
-              <a:t>semble</a:t>
+              <a:t>guts</a:t>
+            </a:r>
+            <a:r>
+              <a:rPr lang="en-GB" dirty="0" smtClean="0"/>
+              <a:t> and use all the possibilities offered by the red line to represent at best your intuition. Don’t look for a justification to your answer, or for an explanation regarding where your intuition could come from – </a:t>
             </a:r>
             <a:r>
               <a:rPr lang="en-GB" b="1" dirty="0" smtClean="0"/>
-              <a:t> </a:t>
-            </a:r>
-            <a:r>
-              <a:rPr lang="en-GB" b="1" dirty="0" err="1" smtClean="0"/>
-              <a:t>approprié</a:t>
-            </a:r>
-            <a:r>
-              <a:rPr lang="en-GB" b="1" dirty="0" smtClean="0"/>
-              <a:t>!</a:t>
-            </a:r>
-          </a:p>
-          <a:p>
-            <a:pPr algn="just"/>
-            <a:endParaRPr lang="fr-FR" sz="1000" b="1" dirty="0" smtClean="0"/>
+              <a:t>just answer as you feel it.</a:t>
+            </a:r>
           </a:p>
           <a:p>
             <a:pPr algn="just"/>
@@ -3975,37 +5132,305 @@
           </a:p>
           <a:p>
             <a:pPr algn="just"/>
-            <a:r>
-              <a:rPr lang="fr-FR" dirty="0" smtClean="0"/>
-              <a:t>Cette expérience n’est pas longue mais un peu répétitive et il vous faut rester concentré(e). Même s’il vous faut être attentif, ne passez pas un temps inutilement long sur chaque phrase, suivez votre intuition: vous lirez la phrase naturellement </a:t>
-            </a:r>
-            <a:r>
-              <a:rPr lang="fr-FR" b="1" dirty="0" smtClean="0"/>
-              <a:t>comme si elle avait été prononcée </a:t>
-            </a:r>
-            <a:r>
-              <a:rPr lang="fr-FR" dirty="0" smtClean="0"/>
-              <a:t>puis, étant donnée l’image affichée vous reporterez votre intuition à l’aide de la barre de jugement rouge. Vous vous habituerez rapidement et intuitivement à</a:t>
-            </a:r>
-            <a:r>
-              <a:rPr lang="en-GB" dirty="0" smtClean="0"/>
-              <a:t> </a:t>
-            </a:r>
-            <a:r>
-              <a:rPr lang="en-GB" dirty="0" err="1" smtClean="0"/>
-              <a:t>cette</a:t>
-            </a:r>
-            <a:r>
-              <a:rPr lang="en-GB" dirty="0" smtClean="0"/>
-              <a:t> </a:t>
-            </a:r>
-            <a:r>
-              <a:rPr lang="en-GB" dirty="0" err="1" smtClean="0"/>
-              <a:t>barre</a:t>
-            </a:r>
-            <a:r>
-              <a:rPr lang="en-GB" dirty="0" smtClean="0"/>
-              <a:t>.</a:t>
+            <a:endParaRPr lang="en-GB" sz="1000" b="1" dirty="0" smtClean="0"/>
+          </a:p>
+          <a:p>
+            <a:pPr algn="just"/>
+            <a:r>
+              <a:rPr lang="fr-FR" dirty="0" smtClean="0"/>
+              <a:t>This </a:t>
+            </a:r>
+            <a:r>
+              <a:rPr lang="fr-FR" dirty="0" err="1" smtClean="0"/>
+              <a:t>study</a:t>
+            </a:r>
+            <a:r>
+              <a:rPr lang="fr-FR" dirty="0" smtClean="0"/>
+              <a:t> </a:t>
+            </a:r>
+            <a:r>
+              <a:rPr lang="fr-FR" dirty="0" err="1" smtClean="0"/>
+              <a:t>is</a:t>
+            </a:r>
+            <a:r>
+              <a:rPr lang="fr-FR" dirty="0" smtClean="0"/>
+              <a:t> not long, but a bit </a:t>
+            </a:r>
+            <a:r>
+              <a:rPr lang="fr-FR" dirty="0" err="1" smtClean="0"/>
+              <a:t>repetitive</a:t>
+            </a:r>
+            <a:r>
+              <a:rPr lang="fr-FR" dirty="0"/>
+              <a:t> </a:t>
+            </a:r>
+            <a:r>
+              <a:rPr lang="fr-FR" dirty="0" smtClean="0"/>
+              <a:t>and</a:t>
+            </a:r>
+            <a:r>
+              <a:rPr lang="fr-FR" dirty="0" smtClean="0"/>
+              <a:t> </a:t>
+            </a:r>
+            <a:r>
+              <a:rPr lang="fr-FR" dirty="0" err="1"/>
+              <a:t>y</a:t>
+            </a:r>
+            <a:r>
+              <a:rPr lang="fr-FR" dirty="0" err="1" smtClean="0"/>
+              <a:t>ou</a:t>
+            </a:r>
+            <a:r>
+              <a:rPr lang="fr-FR" dirty="0" smtClean="0"/>
+              <a:t> must </a:t>
+            </a:r>
+            <a:r>
+              <a:rPr lang="fr-FR" dirty="0" err="1" smtClean="0"/>
+              <a:t>stay</a:t>
+            </a:r>
+            <a:r>
+              <a:rPr lang="fr-FR" dirty="0" smtClean="0"/>
+              <a:t> </a:t>
+            </a:r>
+            <a:r>
+              <a:rPr lang="fr-FR" dirty="0" err="1" smtClean="0"/>
+              <a:t>focused</a:t>
+            </a:r>
+            <a:r>
+              <a:rPr lang="fr-FR" dirty="0" smtClean="0"/>
+              <a:t>. </a:t>
+            </a:r>
+            <a:r>
+              <a:rPr lang="fr-FR" dirty="0" err="1" smtClean="0"/>
+              <a:t>Even</a:t>
+            </a:r>
+            <a:r>
+              <a:rPr lang="fr-FR" dirty="0" smtClean="0"/>
+              <a:t> </a:t>
+            </a:r>
+            <a:r>
+              <a:rPr lang="fr-FR" dirty="0" err="1" smtClean="0"/>
+              <a:t>though</a:t>
+            </a:r>
+            <a:r>
+              <a:rPr lang="fr-FR" dirty="0" smtClean="0"/>
+              <a:t> </a:t>
+            </a:r>
+            <a:r>
+              <a:rPr lang="fr-FR" dirty="0" err="1" smtClean="0"/>
+              <a:t>you</a:t>
+            </a:r>
+            <a:r>
+              <a:rPr lang="fr-FR" dirty="0" smtClean="0"/>
+              <a:t> have to </a:t>
+            </a:r>
+            <a:r>
+              <a:rPr lang="fr-FR" dirty="0" err="1" smtClean="0"/>
+              <a:t>pay</a:t>
+            </a:r>
+            <a:r>
+              <a:rPr lang="fr-FR" dirty="0" smtClean="0"/>
+              <a:t> attention to </a:t>
+            </a:r>
+            <a:r>
+              <a:rPr lang="fr-FR" dirty="0" err="1" smtClean="0"/>
+              <a:t>every</a:t>
+            </a:r>
+            <a:r>
+              <a:rPr lang="fr-FR" dirty="0" smtClean="0"/>
+              <a:t> </a:t>
+            </a:r>
+            <a:r>
+              <a:rPr lang="fr-FR" dirty="0" err="1" smtClean="0"/>
+              <a:t>detail</a:t>
+            </a:r>
+            <a:r>
+              <a:rPr lang="fr-FR" dirty="0" smtClean="0"/>
+              <a:t>, </a:t>
+            </a:r>
+            <a:r>
+              <a:rPr lang="fr-FR" dirty="0" err="1" smtClean="0"/>
+              <a:t>don’t</a:t>
+            </a:r>
+            <a:r>
+              <a:rPr lang="fr-FR" dirty="0" smtClean="0"/>
+              <a:t> </a:t>
+            </a:r>
+            <a:r>
+              <a:rPr lang="fr-FR" dirty="0" err="1" smtClean="0"/>
+              <a:t>spend</a:t>
+            </a:r>
+            <a:r>
+              <a:rPr lang="fr-FR" dirty="0" smtClean="0"/>
+              <a:t> </a:t>
+            </a:r>
+            <a:r>
+              <a:rPr lang="fr-FR" dirty="0" err="1" smtClean="0"/>
+              <a:t>too</a:t>
+            </a:r>
+            <a:r>
+              <a:rPr lang="fr-FR" dirty="0" smtClean="0"/>
+              <a:t> </a:t>
+            </a:r>
+            <a:r>
+              <a:rPr lang="fr-FR" dirty="0" err="1" smtClean="0"/>
+              <a:t>much</a:t>
+            </a:r>
+            <a:r>
+              <a:rPr lang="fr-FR" dirty="0" smtClean="0"/>
+              <a:t> time on </a:t>
+            </a:r>
+            <a:r>
+              <a:rPr lang="fr-FR" dirty="0" err="1" smtClean="0"/>
+              <a:t>every</a:t>
+            </a:r>
+            <a:r>
+              <a:rPr lang="fr-FR" dirty="0" smtClean="0"/>
+              <a:t> sentence. </a:t>
+            </a:r>
+            <a:r>
+              <a:rPr lang="fr-FR" dirty="0"/>
+              <a:t>R</a:t>
+            </a:r>
+            <a:r>
+              <a:rPr lang="fr-FR" dirty="0" smtClean="0"/>
+              <a:t>ead the sentence in </a:t>
+            </a:r>
+            <a:r>
+              <a:rPr lang="fr-FR" dirty="0" err="1" smtClean="0"/>
+              <a:t>your</a:t>
+            </a:r>
+            <a:r>
+              <a:rPr lang="fr-FR" dirty="0" smtClean="0"/>
+              <a:t> </a:t>
+            </a:r>
+            <a:r>
+              <a:rPr lang="fr-FR" dirty="0" err="1" smtClean="0"/>
+              <a:t>head</a:t>
+            </a:r>
+            <a:r>
+              <a:rPr lang="fr-FR" dirty="0" smtClean="0"/>
+              <a:t> and, </a:t>
+            </a:r>
+            <a:r>
+              <a:rPr lang="fr-FR" dirty="0" err="1" smtClean="0"/>
+              <a:t>given</a:t>
+            </a:r>
+            <a:r>
+              <a:rPr lang="fr-FR" dirty="0" smtClean="0"/>
+              <a:t> </a:t>
+            </a:r>
+            <a:r>
+              <a:rPr lang="fr-FR" dirty="0" err="1" smtClean="0"/>
+              <a:t>what</a:t>
+            </a:r>
+            <a:r>
+              <a:rPr lang="fr-FR" dirty="0" smtClean="0"/>
+              <a:t> </a:t>
+            </a:r>
+            <a:r>
+              <a:rPr lang="fr-FR" dirty="0" err="1" smtClean="0"/>
+              <a:t>you</a:t>
+            </a:r>
+            <a:r>
+              <a:rPr lang="fr-FR" dirty="0" smtClean="0"/>
+              <a:t> </a:t>
+            </a:r>
+            <a:r>
+              <a:rPr lang="fr-FR" dirty="0" err="1" smtClean="0"/>
+              <a:t>see</a:t>
+            </a:r>
+            <a:r>
+              <a:rPr lang="fr-FR" dirty="0" smtClean="0"/>
+              <a:t> on the </a:t>
+            </a:r>
+            <a:r>
+              <a:rPr lang="fr-FR" dirty="0" err="1" smtClean="0"/>
+              <a:t>picture</a:t>
+            </a:r>
+            <a:r>
+              <a:rPr lang="fr-FR" dirty="0" smtClean="0"/>
+              <a:t>, tell us </a:t>
+            </a:r>
+            <a:r>
+              <a:rPr lang="fr-FR" dirty="0" err="1" smtClean="0"/>
+              <a:t>your</a:t>
+            </a:r>
+            <a:r>
+              <a:rPr lang="fr-FR" dirty="0" smtClean="0"/>
+              <a:t> intuition </a:t>
+            </a:r>
+            <a:r>
+              <a:rPr lang="fr-FR" dirty="0" err="1" smtClean="0"/>
+              <a:t>using</a:t>
+            </a:r>
+            <a:r>
+              <a:rPr lang="fr-FR" dirty="0" smtClean="0"/>
+              <a:t> the </a:t>
+            </a:r>
+            <a:r>
+              <a:rPr lang="fr-FR" dirty="0" err="1" smtClean="0"/>
+              <a:t>red</a:t>
+            </a:r>
+            <a:r>
+              <a:rPr lang="fr-FR" dirty="0" smtClean="0"/>
+              <a:t> </a:t>
+            </a:r>
+            <a:r>
+              <a:rPr lang="fr-FR" dirty="0" err="1" smtClean="0"/>
+              <a:t>answer</a:t>
+            </a:r>
+            <a:r>
+              <a:rPr lang="fr-FR" dirty="0" smtClean="0"/>
+              <a:t> bar. You </a:t>
+            </a:r>
+            <a:r>
+              <a:rPr lang="fr-FR" dirty="0" err="1" smtClean="0"/>
+              <a:t>will</a:t>
+            </a:r>
+            <a:r>
+              <a:rPr lang="fr-FR" dirty="0" smtClean="0"/>
+              <a:t> </a:t>
+            </a:r>
+            <a:r>
+              <a:rPr lang="fr-FR" dirty="0" err="1" smtClean="0"/>
+              <a:t>get</a:t>
+            </a:r>
+            <a:r>
+              <a:rPr lang="fr-FR" dirty="0" smtClean="0"/>
+              <a:t> </a:t>
+            </a:r>
+            <a:r>
+              <a:rPr lang="fr-FR" dirty="0" err="1" smtClean="0"/>
+              <a:t>used</a:t>
+            </a:r>
+            <a:r>
+              <a:rPr lang="fr-FR" dirty="0" smtClean="0"/>
+              <a:t> to </a:t>
+            </a:r>
+            <a:r>
+              <a:rPr lang="fr-FR" dirty="0" err="1" smtClean="0"/>
+              <a:t>this</a:t>
+            </a:r>
+            <a:r>
+              <a:rPr lang="fr-FR" dirty="0" smtClean="0"/>
+              <a:t> bar </a:t>
+            </a:r>
+            <a:r>
+              <a:rPr lang="fr-FR" dirty="0" err="1" smtClean="0"/>
+              <a:t>very</a:t>
+            </a:r>
+            <a:r>
+              <a:rPr lang="fr-FR" dirty="0" smtClean="0"/>
+              <a:t> </a:t>
+            </a:r>
+            <a:r>
+              <a:rPr lang="fr-FR" dirty="0" err="1" smtClean="0"/>
+              <a:t>quickly</a:t>
+            </a:r>
+            <a:r>
+              <a:rPr lang="fr-FR" dirty="0" smtClean="0"/>
+              <a:t>.   </a:t>
             </a:r>
           </a:p>
           <a:p>
@@ -4015,9 +5440,14 @@
           <a:p>
             <a:pPr algn="just"/>
             <a:r>
-              <a:rPr lang="fr-FR" dirty="0" smtClean="0"/>
-              <a:t>Parfois les phrases se ressemblent, ça n’a pas d’importance, répondez chaque fois en suivant votre intuition pour chaque exemple, indépendamment de vos réponses précédentes.</a:t>
-            </a:r>
+              <a:rPr lang="en-GB" dirty="0" smtClean="0"/>
+              <a:t>Sentences will sometimes look the same. </a:t>
+            </a:r>
+            <a:r>
+              <a:rPr lang="en-GB" dirty="0" smtClean="0"/>
+              <a:t>That doesn’t matter. Answer every time following your intuition, independently of your previous answers. </a:t>
+            </a:r>
+            <a:endParaRPr lang="en-GB" dirty="0" smtClean="0"/>
           </a:p>
           <a:p>
             <a:pPr algn="just"/>
@@ -4025,25 +5455,54 @@
           </a:p>
           <a:p>
             <a:pPr algn="just"/>
+            <a:endParaRPr lang="fr-FR" dirty="0" smtClean="0"/>
+          </a:p>
+          <a:p>
+            <a:pPr algn="just"/>
             <a:endParaRPr lang="fr-FR" sz="1000" dirty="0" smtClean="0"/>
           </a:p>
           <a:p>
             <a:pPr algn="ctr"/>
             <a:r>
-              <a:rPr lang="fr-FR" i="1" dirty="0" smtClean="0"/>
-              <a:t>Appuyez sur </a:t>
-            </a:r>
-            <a:r>
-              <a:rPr lang="fr-FR" i="1" dirty="0" smtClean="0"/>
-              <a:t>ESPACE </a:t>
-            </a:r>
-            <a:r>
-              <a:rPr lang="fr-FR" i="1" dirty="0" smtClean="0"/>
-              <a:t>quand vous êtes prêt(e)…</a:t>
-            </a:r>
-            <a:endParaRPr lang="fr-FR" b="1" i="1" dirty="0" smtClean="0"/>
-          </a:p>
-          <a:p>
+              <a:rPr lang="fr-FR" sz="2000" i="1" dirty="0" err="1" smtClean="0"/>
+              <a:t>Press</a:t>
+            </a:r>
+            <a:r>
+              <a:rPr lang="fr-FR" sz="2000" i="1" dirty="0" smtClean="0"/>
+              <a:t> SPACEBAR </a:t>
+            </a:r>
+            <a:r>
+              <a:rPr lang="fr-FR" sz="2000" i="1" dirty="0" err="1" smtClean="0"/>
+              <a:t>when</a:t>
+            </a:r>
+            <a:r>
+              <a:rPr lang="fr-FR" sz="2000" i="1" dirty="0" smtClean="0"/>
+              <a:t> </a:t>
+            </a:r>
+            <a:r>
+              <a:rPr lang="fr-FR" sz="2000" i="1" dirty="0" err="1" smtClean="0"/>
+              <a:t>you</a:t>
+            </a:r>
+            <a:r>
+              <a:rPr lang="fr-FR" sz="2000" i="1" dirty="0" smtClean="0"/>
+              <a:t> are </a:t>
+            </a:r>
+            <a:r>
+              <a:rPr lang="fr-FR" sz="2000" i="1" dirty="0" err="1" smtClean="0"/>
+              <a:t>ready</a:t>
+            </a:r>
+            <a:r>
+              <a:rPr lang="fr-FR" sz="2000" i="1" dirty="0" smtClean="0"/>
+              <a:t> to </a:t>
+            </a:r>
+            <a:r>
+              <a:rPr lang="fr-FR" sz="2000" i="1" dirty="0" err="1" smtClean="0"/>
+              <a:t>start</a:t>
+            </a:r>
+            <a:r>
+              <a:rPr lang="fr-FR" sz="2000" i="1" dirty="0" smtClean="0"/>
+              <a:t>…</a:t>
+            </a:r>
             <a:endParaRPr lang="fr-FR" b="1" dirty="0" smtClean="0"/>
           </a:p>
           <a:p>
@@ -4056,6 +5515,103 @@
   <p:clrMapOvr>
     <a:masterClrMapping/>
   </p:clrMapOvr>
+  <p:timing>
+    <p:tnLst>
+      <p:par>
+        <p:cTn xmlns:p14="http://schemas.microsoft.com/office/powerpoint/2010/main" id="1" dur="indefinite" restart="never" nodeType="tmRoot"/>
+      </p:par>
+    </p:tnLst>
+  </p:timing>
+</p:sld>
+</file>
+
+<file path=ppt/slides/slide3.xml><?xml version="1.0" encoding="utf-8"?>
+<p:sld xmlns:a="http://schemas.openxmlformats.org/drawingml/2006/main" xmlns:r="http://schemas.openxmlformats.org/officeDocument/2006/relationships" xmlns:p="http://schemas.openxmlformats.org/presentationml/2006/main">
+  <p:cSld>
+    <p:spTree>
+      <p:nvGrpSpPr>
+        <p:cNvPr id="1" name=""/>
+        <p:cNvGrpSpPr/>
+        <p:nvPr/>
+      </p:nvGrpSpPr>
+      <p:grpSpPr>
+        <a:xfrm>
+          <a:off x="0" y="0"/>
+          <a:ext cx="0" cy="0"/>
+          <a:chOff x="0" y="0"/>
+          <a:chExt cx="0" cy="0"/>
+        </a:xfrm>
+      </p:grpSpPr>
+      <p:pic>
+        <p:nvPicPr>
+          <p:cNvPr id="2" name="Picture 1"/>
+          <p:cNvPicPr>
+            <a:picLocks noChangeAspect="1"/>
+          </p:cNvPicPr>
+          <p:nvPr/>
+        </p:nvPicPr>
+        <p:blipFill>
+          <a:blip r:embed="rId2"/>
+          <a:stretch>
+            <a:fillRect/>
+          </a:stretch>
+        </p:blipFill>
+        <p:spPr>
+          <a:xfrm>
+            <a:off x="3779912" y="1700808"/>
+            <a:ext cx="2048272" cy="2200961"/>
+          </a:xfrm>
+          <a:prstGeom prst="rect">
+            <a:avLst/>
+          </a:prstGeom>
+          <a:solidFill>
+            <a:srgbClr val="FFFFFF">
+              <a:shade val="85000"/>
+            </a:srgbClr>
+          </a:solidFill>
+          <a:ln w="190500" cap="rnd">
+            <a:solidFill>
+              <a:srgbClr val="FFFFFF"/>
+            </a:solidFill>
+          </a:ln>
+          <a:effectLst>
+            <a:outerShdw blurRad="50000" algn="tl" rotWithShape="0">
+              <a:srgbClr val="000000">
+                <a:alpha val="41000"/>
+              </a:srgbClr>
+            </a:outerShdw>
+          </a:effectLst>
+          <a:scene3d>
+            <a:camera prst="orthographicFront"/>
+            <a:lightRig rig="twoPt" dir="t">
+              <a:rot lat="0" lon="0" rev="7800000"/>
+            </a:lightRig>
+          </a:scene3d>
+          <a:sp3d contourW="6350">
+            <a:bevelT w="50800" h="16510"/>
+            <a:contourClr>
+              <a:srgbClr val="C0C0C0"/>
+            </a:contourClr>
+          </a:sp3d>
+        </p:spPr>
+      </p:pic>
+    </p:spTree>
+    <p:extLst>
+      <p:ext uri="{BB962C8B-B14F-4D97-AF65-F5344CB8AC3E}">
+        <p14:creationId xmlns:p14="http://schemas.microsoft.com/office/powerpoint/2010/main" val="878988788"/>
+      </p:ext>
+    </p:extLst>
+  </p:cSld>
+  <p:clrMapOvr>
+    <a:masterClrMapping/>
+  </p:clrMapOvr>
+  <p:timing>
+    <p:tnLst>
+      <p:par>
+        <p:cTn xmlns:p14="http://schemas.microsoft.com/office/powerpoint/2010/main" id="1" dur="indefinite" restart="never" nodeType="tmRoot"/>
+      </p:par>
+    </p:tnLst>
+  </p:timing>
 </p:sld>
 </file>
 

</xml_diff>

<commit_message>
Instructions updated (thanks Dan!)
</commit_message>
<xml_diff>
--- a/instuctions_numerals.pptx
+++ b/instuctions_numerals.pptx
@@ -7,7 +7,6 @@
   <p:sldIdLst>
     <p:sldId id="256" r:id="rId2"/>
     <p:sldId id="257" r:id="rId3"/>
-    <p:sldId id="258" r:id="rId4"/>
   </p:sldIdLst>
   <p:sldSz cx="9144000" cy="6858000" type="screen4x3"/>
   <p:notesSz cx="6858000" cy="9144000"/>
@@ -304,7 +303,7 @@
             <a:fld id="{AA309A6D-C09C-4548-B29A-6CF363A7E532}" type="datetimeFigureOut">
               <a:rPr lang="fr-FR" smtClean="0"/>
               <a:pPr/>
-              <a:t>11/5/13</a:t>
+              <a:t>11/7/13</a:t>
             </a:fld>
             <a:endParaRPr lang="fr-BE"/>
           </a:p>
@@ -659,7 +658,7 @@
             <a:fld id="{AA309A6D-C09C-4548-B29A-6CF363A7E532}" type="datetimeFigureOut">
               <a:rPr lang="fr-FR" smtClean="0"/>
               <a:pPr/>
-              <a:t>11/5/13</a:t>
+              <a:t>11/7/13</a:t>
             </a:fld>
             <a:endParaRPr lang="fr-BE"/>
           </a:p>
@@ -836,7 +835,7 @@
             <a:fld id="{AA309A6D-C09C-4548-B29A-6CF363A7E532}" type="datetimeFigureOut">
               <a:rPr lang="fr-FR" smtClean="0"/>
               <a:pPr/>
-              <a:t>11/5/13</a:t>
+              <a:t>11/7/13</a:t>
             </a:fld>
             <a:endParaRPr lang="fr-BE"/>
           </a:p>
@@ -951,7 +950,7 @@
             <a:fld id="{AA309A6D-C09C-4548-B29A-6CF363A7E532}" type="datetimeFigureOut">
               <a:rPr lang="fr-FR" smtClean="0"/>
               <a:pPr/>
-              <a:t>11/5/13</a:t>
+              <a:t>11/7/13</a:t>
             </a:fld>
             <a:endParaRPr lang="fr-BE"/>
           </a:p>
@@ -1311,7 +1310,7 @@
             <a:fld id="{AA309A6D-C09C-4548-B29A-6CF363A7E532}" type="datetimeFigureOut">
               <a:rPr lang="fr-FR" smtClean="0"/>
               <a:pPr/>
-              <a:t>11/5/13</a:t>
+              <a:t>11/7/13</a:t>
             </a:fld>
             <a:endParaRPr lang="fr-BE"/>
           </a:p>
@@ -1578,7 +1577,7 @@
             <a:fld id="{AA309A6D-C09C-4548-B29A-6CF363A7E532}" type="datetimeFigureOut">
               <a:rPr lang="fr-FR" smtClean="0"/>
               <a:pPr/>
-              <a:t>11/5/13</a:t>
+              <a:t>11/7/13</a:t>
             </a:fld>
             <a:endParaRPr lang="fr-BE"/>
           </a:p>
@@ -1942,7 +1941,7 @@
             <a:fld id="{AA309A6D-C09C-4548-B29A-6CF363A7E532}" type="datetimeFigureOut">
               <a:rPr lang="fr-FR" smtClean="0"/>
               <a:pPr/>
-              <a:t>11/5/13</a:t>
+              <a:t>11/7/13</a:t>
             </a:fld>
             <a:endParaRPr lang="fr-BE"/>
           </a:p>
@@ -2171,7 +2170,7 @@
             <a:fld id="{AA309A6D-C09C-4548-B29A-6CF363A7E532}" type="datetimeFigureOut">
               <a:rPr lang="fr-FR" smtClean="0"/>
               <a:pPr/>
-              <a:t>11/5/13</a:t>
+              <a:t>11/7/13</a:t>
             </a:fld>
             <a:endParaRPr lang="fr-BE"/>
           </a:p>
@@ -2263,7 +2262,7 @@
             <a:fld id="{AA309A6D-C09C-4548-B29A-6CF363A7E532}" type="datetimeFigureOut">
               <a:rPr lang="fr-FR" smtClean="0"/>
               <a:pPr/>
-              <a:t>11/5/13</a:t>
+              <a:t>11/7/13</a:t>
             </a:fld>
             <a:endParaRPr lang="fr-BE"/>
           </a:p>
@@ -2532,7 +2531,7 @@
             <a:fld id="{AA309A6D-C09C-4548-B29A-6CF363A7E532}" type="datetimeFigureOut">
               <a:rPr lang="fr-FR" smtClean="0"/>
               <a:pPr/>
-              <a:t>11/5/13</a:t>
+              <a:t>11/7/13</a:t>
             </a:fld>
             <a:endParaRPr lang="fr-BE"/>
           </a:p>
@@ -2762,7 +2761,7 @@
             <a:fld id="{AA309A6D-C09C-4548-B29A-6CF363A7E532}" type="datetimeFigureOut">
               <a:rPr lang="fr-FR" smtClean="0"/>
               <a:pPr/>
-              <a:t>11/5/13</a:t>
+              <a:t>11/7/13</a:t>
             </a:fld>
             <a:endParaRPr lang="fr-BE"/>
           </a:p>
@@ -3263,7 +3262,7 @@
             <a:fld id="{AA309A6D-C09C-4548-B29A-6CF363A7E532}" type="datetimeFigureOut">
               <a:rPr lang="fr-FR" smtClean="0"/>
               <a:pPr/>
-              <a:t>11/5/13</a:t>
+              <a:t>11/7/13</a:t>
             </a:fld>
             <a:endParaRPr lang="fr-BE"/>
           </a:p>
@@ -3677,7 +3676,7 @@
         <p:spPr>
           <a:xfrm>
             <a:off x="107504" y="-27384"/>
-            <a:ext cx="8928992" cy="969496"/>
+            <a:ext cx="8928992" cy="1238801"/>
           </a:xfrm>
           <a:prstGeom prst="rect">
             <a:avLst/>
@@ -3999,31 +3998,6 @@
               </a:rPr>
               <a:t>,</a:t>
             </a:r>
-            <a:endParaRPr lang="fr-FR" sz="2200" b="1" dirty="0" smtClean="0">
-              <a:ln w="12700">
-                <a:solidFill>
-                  <a:schemeClr val="tx2">
-                    <a:satMod val="155000"/>
-                  </a:schemeClr>
-                </a:solidFill>
-                <a:prstDash val="solid"/>
-              </a:ln>
-              <a:solidFill>
-                <a:schemeClr val="bg2">
-                  <a:tint val="85000"/>
-                  <a:satMod val="155000"/>
-                </a:schemeClr>
-              </a:solidFill>
-              <a:effectLst>
-                <a:outerShdw blurRad="41275" dist="20320" dir="1800000" algn="tl" rotWithShape="0">
-                  <a:srgbClr val="000000">
-                    <a:alpha val="40000"/>
-                  </a:srgbClr>
-                </a:outerShdw>
-              </a:effectLst>
-              <a:latin typeface="Apple Chancery"/>
-              <a:cs typeface="Apple Chancery"/>
-            </a:endParaRPr>
           </a:p>
           <a:p>
             <a:pPr algn="just"/>
@@ -4032,121 +4006,10 @@
           <a:p>
             <a:pPr algn="just"/>
             <a:r>
-              <a:rPr lang="fr-FR" dirty="0" smtClean="0"/>
-              <a:t>You </a:t>
-            </a:r>
-            <a:r>
-              <a:rPr lang="fr-FR" dirty="0" err="1" smtClean="0"/>
-              <a:t>will</a:t>
-            </a:r>
-            <a:r>
-              <a:rPr lang="fr-FR" dirty="0" smtClean="0"/>
-              <a:t> </a:t>
-            </a:r>
-            <a:r>
-              <a:rPr lang="fr-FR" dirty="0" err="1" smtClean="0"/>
-              <a:t>be</a:t>
-            </a:r>
-            <a:r>
-              <a:rPr lang="fr-FR" dirty="0" smtClean="0"/>
-              <a:t> </a:t>
-            </a:r>
-            <a:r>
-              <a:rPr lang="fr-FR" dirty="0" err="1" smtClean="0"/>
-              <a:t>presented</a:t>
-            </a:r>
-            <a:r>
-              <a:rPr lang="fr-FR" dirty="0" smtClean="0"/>
-              <a:t> </a:t>
-            </a:r>
-            <a:r>
-              <a:rPr lang="fr-FR" dirty="0" err="1" smtClean="0"/>
-              <a:t>with</a:t>
-            </a:r>
-            <a:r>
-              <a:rPr lang="fr-FR" dirty="0" smtClean="0"/>
-              <a:t> sentence-</a:t>
-            </a:r>
-            <a:r>
-              <a:rPr lang="fr-FR" dirty="0" err="1" smtClean="0"/>
-              <a:t>picture</a:t>
-            </a:r>
-            <a:r>
-              <a:rPr lang="fr-FR" dirty="0" smtClean="0"/>
-              <a:t> items</a:t>
-            </a:r>
-            <a:r>
-              <a:rPr lang="fr-FR" dirty="0" smtClean="0"/>
-              <a:t>. </a:t>
-            </a:r>
-            <a:r>
-              <a:rPr lang="fr-FR" dirty="0" err="1" smtClean="0"/>
-              <a:t>Here</a:t>
-            </a:r>
-            <a:r>
-              <a:rPr lang="fr-FR" dirty="0" smtClean="0"/>
-              <a:t> </a:t>
-            </a:r>
-            <a:r>
-              <a:rPr lang="fr-FR" dirty="0" err="1" smtClean="0"/>
-              <a:t>is</a:t>
-            </a:r>
-            <a:r>
-              <a:rPr lang="fr-FR" dirty="0" smtClean="0"/>
-              <a:t> an </a:t>
-            </a:r>
-            <a:r>
-              <a:rPr lang="fr-FR" dirty="0" err="1" smtClean="0"/>
-              <a:t>example</a:t>
-            </a:r>
-            <a:r>
-              <a:rPr lang="fr-FR" dirty="0" smtClean="0"/>
-              <a:t> of </a:t>
-            </a:r>
-            <a:r>
-              <a:rPr lang="fr-FR" dirty="0" err="1" smtClean="0"/>
-              <a:t>what</a:t>
-            </a:r>
-            <a:r>
-              <a:rPr lang="fr-FR" dirty="0" smtClean="0"/>
-              <a:t> </a:t>
-            </a:r>
-            <a:r>
-              <a:rPr lang="fr-FR" dirty="0" err="1" smtClean="0"/>
-              <a:t>you</a:t>
-            </a:r>
-            <a:r>
-              <a:rPr lang="fr-FR" dirty="0" smtClean="0"/>
-              <a:t> </a:t>
-            </a:r>
-            <a:r>
-              <a:rPr lang="fr-FR" dirty="0" err="1" smtClean="0"/>
-              <a:t>will</a:t>
-            </a:r>
-            <a:r>
-              <a:rPr lang="fr-FR" dirty="0" smtClean="0"/>
-              <a:t> </a:t>
-            </a:r>
-            <a:r>
-              <a:rPr lang="fr-FR" dirty="0" err="1" smtClean="0"/>
-              <a:t>see</a:t>
-            </a:r>
-            <a:r>
-              <a:rPr lang="fr-FR" dirty="0" smtClean="0"/>
-              <a:t> on the </a:t>
-            </a:r>
-            <a:r>
-              <a:rPr lang="fr-FR" dirty="0" err="1" smtClean="0"/>
-              <a:t>screen</a:t>
-            </a:r>
-            <a:r>
-              <a:rPr lang="fr-FR" dirty="0" smtClean="0"/>
-              <a:t>:</a:t>
-            </a:r>
-            <a:r>
-              <a:rPr lang="fr-FR" dirty="0" smtClean="0"/>
-              <a:t> </a:t>
-            </a:r>
+              <a:rPr lang="en-US" dirty="0"/>
+              <a:t>In this study you will be presented with items containing a picture and a sentence. Here is an example of what you will see on the screen:</a:t>
+            </a:r>
+            <a:endParaRPr lang="fr-FR" dirty="0" smtClean="0"/>
           </a:p>
         </p:txBody>
       </p:sp>
@@ -4158,8 +4021,8 @@
         </p:nvSpPr>
         <p:spPr>
           <a:xfrm>
-            <a:off x="107504" y="3352631"/>
-            <a:ext cx="8928992" cy="3877985"/>
+            <a:off x="107504" y="3244908"/>
+            <a:ext cx="8928992" cy="4101123"/>
           </a:xfrm>
           <a:prstGeom prst="rect">
             <a:avLst/>
@@ -4174,777 +4037,72 @@
           <a:p>
             <a:pPr algn="just"/>
             <a:r>
-              <a:rPr lang="fr-FR" dirty="0" smtClean="0"/>
-              <a:t>For </a:t>
-            </a:r>
-            <a:r>
-              <a:rPr lang="fr-FR" dirty="0" err="1" smtClean="0"/>
-              <a:t>each</a:t>
-            </a:r>
-            <a:r>
-              <a:rPr lang="fr-FR" dirty="0" smtClean="0"/>
-              <a:t> item, </a:t>
-            </a:r>
-            <a:r>
-              <a:rPr lang="fr-FR" dirty="0" err="1"/>
-              <a:t>y</a:t>
-            </a:r>
-            <a:r>
-              <a:rPr lang="fr-FR" dirty="0" err="1" smtClean="0"/>
-              <a:t>our</a:t>
-            </a:r>
-            <a:r>
-              <a:rPr lang="fr-FR" dirty="0" smtClean="0"/>
+              <a:rPr lang="en-US" dirty="0"/>
+              <a:t>For each item, your task is to tell us whether the sentence is true or false as a description of the picture it is paired with. For instance, in the example above, the sentence is true.</a:t>
+            </a:r>
+          </a:p>
+          <a:p>
+            <a:pPr algn="just"/>
+            <a:endParaRPr lang="en-US" sz="1050" dirty="0"/>
+          </a:p>
+          <a:p>
+            <a:pPr algn="just"/>
+            <a:r>
+              <a:rPr lang="en-US" b="1" dirty="0"/>
+              <a:t>Important: this is not a math test! </a:t>
+            </a:r>
+            <a:r>
+              <a:rPr lang="en-US" dirty="0"/>
+              <a:t>In fact, in many cases, it might not be entirely clear whether the sentence is false, but it may be a better or worse description of the picture. For this reason, you will be able to give more fine-grained judgments than a simple ‘True’ or ‘False’: you will give your answer along a continuum, by using the cursor to set the right end of a red line going between ‘False’ (left) and ‘True’ (right). The more the sentence seems to be a good description of the picture, the more you should move the end of the red line toward ‘True’. For example, this is the case for an example like the one above, and thus the best answer would look like what you see above, with the red bar all the way to the 'True' end. Conversely, if the sentence sounds very inappropriate, you should move the red line all the way to the 'False' </a:t>
+            </a:r>
+            <a:r>
+              <a:rPr lang="en-US" dirty="0" smtClean="0"/>
+              <a:t>end.</a:t>
+            </a:r>
+            <a:r>
+              <a:rPr lang="fr-FR" sz="1000" dirty="0"/>
               <a:t> </a:t>
             </a:r>
             <a:r>
-              <a:rPr lang="fr-FR" dirty="0" err="1" smtClean="0"/>
-              <a:t>task</a:t>
-            </a:r>
-            <a:r>
-              <a:rPr lang="fr-FR" dirty="0" smtClean="0"/>
+              <a:rPr lang="fr-FR" sz="1000" dirty="0" smtClean="0"/>
+              <a:t>                                                                                                   </a:t>
+            </a:r>
+          </a:p>
+          <a:p>
+            <a:pPr algn="r"/>
+            <a:r>
+              <a:rPr lang="fr-FR" sz="1000" b="1" dirty="0" smtClean="0"/>
               <a:t> </a:t>
             </a:r>
             <a:r>
-              <a:rPr lang="fr-FR" dirty="0" err="1" smtClean="0"/>
-              <a:t>is</a:t>
-            </a:r>
-            <a:r>
-              <a:rPr lang="fr-FR" dirty="0" smtClean="0"/>
-              <a:t> to tell us </a:t>
-            </a:r>
-            <a:r>
-              <a:rPr lang="fr-FR" dirty="0" err="1" smtClean="0"/>
-              <a:t>whether</a:t>
-            </a:r>
-            <a:r>
-              <a:rPr lang="fr-FR" dirty="0" smtClean="0"/>
-              <a:t> the senten</a:t>
-            </a:r>
-            <a:r>
-              <a:rPr lang="fr-FR" dirty="0" smtClean="0"/>
-              <a:t>ce </a:t>
-            </a:r>
-            <a:r>
-              <a:rPr lang="fr-FR" dirty="0" err="1" smtClean="0"/>
-              <a:t>is</a:t>
-            </a:r>
-            <a:r>
-              <a:rPr lang="fr-FR" dirty="0" smtClean="0"/>
+              <a:rPr lang="fr-FR" sz="2000" b="1" i="1" dirty="0" err="1" smtClean="0"/>
+              <a:t>Press</a:t>
+            </a:r>
+            <a:r>
+              <a:rPr lang="fr-FR" sz="2000" b="1" i="1" dirty="0" smtClean="0"/>
               <a:t> </a:t>
             </a:r>
             <a:r>
-              <a:rPr lang="fr-FR" dirty="0" err="1" smtClean="0"/>
-              <a:t>true</a:t>
-            </a:r>
-            <a:r>
-              <a:rPr lang="fr-FR" dirty="0" smtClean="0"/>
-              <a:t> or false of the </a:t>
-            </a:r>
-            <a:r>
-              <a:rPr lang="fr-FR" dirty="0" err="1" smtClean="0"/>
-              <a:t>picture</a:t>
-            </a:r>
-            <a:r>
-              <a:rPr lang="fr-FR" dirty="0" smtClean="0"/>
-              <a:t> </a:t>
-            </a:r>
-            <a:r>
-              <a:rPr lang="fr-FR" dirty="0" err="1" smtClean="0"/>
-              <a:t>it</a:t>
-            </a:r>
-            <a:r>
-              <a:rPr lang="fr-FR" dirty="0" smtClean="0"/>
-              <a:t> </a:t>
-            </a:r>
-            <a:r>
-              <a:rPr lang="fr-FR" dirty="0" err="1" smtClean="0"/>
-              <a:t>is</a:t>
-            </a:r>
-            <a:r>
-              <a:rPr lang="fr-FR" dirty="0" smtClean="0"/>
-              <a:t> </a:t>
-            </a:r>
-            <a:r>
-              <a:rPr lang="fr-FR" dirty="0" err="1" smtClean="0"/>
-              <a:t>paired</a:t>
-            </a:r>
-            <a:r>
-              <a:rPr lang="fr-FR" dirty="0" smtClean="0"/>
-              <a:t> </a:t>
-            </a:r>
-            <a:r>
-              <a:rPr lang="fr-FR" dirty="0" err="1" smtClean="0"/>
-              <a:t>with</a:t>
-            </a:r>
-            <a:r>
-              <a:rPr lang="fr-FR" dirty="0" smtClean="0"/>
-              <a:t>. For instance, in the </a:t>
-            </a:r>
-            <a:r>
-              <a:rPr lang="fr-FR" dirty="0" err="1" smtClean="0"/>
-              <a:t>example</a:t>
-            </a:r>
-            <a:r>
-              <a:rPr lang="fr-FR" dirty="0" smtClean="0"/>
-              <a:t> </a:t>
-            </a:r>
-            <a:r>
-              <a:rPr lang="fr-FR" dirty="0" err="1" smtClean="0"/>
-              <a:t>above</a:t>
-            </a:r>
-            <a:r>
-              <a:rPr lang="fr-FR" dirty="0" smtClean="0"/>
-              <a:t>, the sentence </a:t>
-            </a:r>
-            <a:r>
-              <a:rPr lang="fr-FR" dirty="0" err="1" smtClean="0"/>
-              <a:t>is</a:t>
-            </a:r>
-            <a:r>
-              <a:rPr lang="fr-FR" dirty="0" smtClean="0"/>
-              <a:t> </a:t>
-            </a:r>
-            <a:r>
-              <a:rPr lang="fr-FR" dirty="0" err="1" smtClean="0"/>
-              <a:t>true</a:t>
-            </a:r>
-            <a:r>
-              <a:rPr lang="fr-FR" dirty="0" smtClean="0"/>
-              <a:t>.</a:t>
-            </a:r>
-            <a:endParaRPr lang="fr-FR" dirty="0" smtClean="0"/>
-          </a:p>
-          <a:p>
-            <a:pPr algn="just"/>
-            <a:endParaRPr lang="en-US" sz="400" dirty="0" smtClean="0"/>
-          </a:p>
-          <a:p>
-            <a:pPr algn="just"/>
-            <a:r>
-              <a:rPr lang="fr-FR" b="1" dirty="0" smtClean="0"/>
-              <a:t>Important</a:t>
-            </a:r>
-            <a:r>
-              <a:rPr lang="fr-FR" b="1" dirty="0" smtClean="0"/>
-              <a:t>: </a:t>
-            </a:r>
-            <a:r>
-              <a:rPr lang="fr-FR" b="1" dirty="0" err="1" smtClean="0"/>
-              <a:t>this</a:t>
-            </a:r>
-            <a:r>
-              <a:rPr lang="fr-FR" b="1" dirty="0" smtClean="0"/>
-              <a:t> </a:t>
-            </a:r>
-            <a:r>
-              <a:rPr lang="fr-FR" b="1" dirty="0" err="1" smtClean="0"/>
-              <a:t>is</a:t>
-            </a:r>
-            <a:r>
-              <a:rPr lang="fr-FR" b="1" dirty="0" smtClean="0"/>
-              <a:t> not a math test! </a:t>
-            </a:r>
-            <a:r>
-              <a:rPr lang="fr-FR" dirty="0" smtClean="0"/>
-              <a:t>In </a:t>
-            </a:r>
-            <a:r>
-              <a:rPr lang="en-GB" dirty="0" smtClean="0"/>
-              <a:t>fact</a:t>
-            </a:r>
-            <a:r>
-              <a:rPr lang="fr-FR" dirty="0" smtClean="0"/>
-              <a:t>, in </a:t>
-            </a:r>
-            <a:r>
-              <a:rPr lang="fr-FR" dirty="0" err="1" smtClean="0"/>
-              <a:t>many</a:t>
-            </a:r>
-            <a:r>
-              <a:rPr lang="fr-FR" dirty="0" smtClean="0"/>
-              <a:t> cases, the sentence </a:t>
-            </a:r>
-            <a:r>
-              <a:rPr lang="fr-FR" dirty="0" err="1" smtClean="0"/>
-              <a:t>might</a:t>
-            </a:r>
-            <a:r>
-              <a:rPr lang="fr-FR" dirty="0" smtClean="0"/>
-              <a:t> not </a:t>
-            </a:r>
-            <a:r>
-              <a:rPr lang="fr-FR" dirty="0" err="1" smtClean="0"/>
-              <a:t>be</a:t>
-            </a:r>
-            <a:r>
-              <a:rPr lang="fr-FR" dirty="0" smtClean="0"/>
-              <a:t> </a:t>
-            </a:r>
-            <a:r>
-              <a:rPr lang="fr-FR" dirty="0" err="1" smtClean="0"/>
-              <a:t>clearly</a:t>
-            </a:r>
-            <a:r>
-              <a:rPr lang="fr-FR" dirty="0" smtClean="0"/>
-              <a:t> </a:t>
-            </a:r>
-            <a:r>
-              <a:rPr lang="fr-FR" dirty="0" err="1" smtClean="0"/>
-              <a:t>true</a:t>
-            </a:r>
-            <a:r>
-              <a:rPr lang="fr-FR" dirty="0" smtClean="0"/>
-              <a:t> or </a:t>
-            </a:r>
-            <a:r>
-              <a:rPr lang="fr-FR" dirty="0" err="1" smtClean="0"/>
-              <a:t>clearly</a:t>
-            </a:r>
-            <a:r>
-              <a:rPr lang="fr-FR" dirty="0" smtClean="0"/>
-              <a:t> false, but </a:t>
-            </a:r>
-            <a:r>
-              <a:rPr lang="fr-FR" dirty="0" err="1" smtClean="0"/>
-              <a:t>describes</a:t>
-            </a:r>
-            <a:r>
-              <a:rPr lang="fr-FR" dirty="0" smtClean="0"/>
+              <a:rPr lang="fr-FR" sz="2000" b="1" i="1" dirty="0" smtClean="0"/>
+              <a:t>SPACEBAR to </a:t>
+            </a:r>
+            <a:r>
+              <a:rPr lang="fr-FR" sz="2000" b="1" i="1" dirty="0" err="1" smtClean="0"/>
+              <a:t>read</a:t>
+            </a:r>
+            <a:r>
+              <a:rPr lang="fr-FR" sz="2000" b="1" i="1" dirty="0" smtClean="0"/>
               <a:t> the </a:t>
             </a:r>
             <a:r>
-              <a:rPr lang="fr-FR" dirty="0" err="1" smtClean="0"/>
-              <a:t>picture</a:t>
-            </a:r>
-            <a:r>
-              <a:rPr lang="fr-FR" dirty="0" smtClean="0"/>
-              <a:t> more or </a:t>
-            </a:r>
-            <a:r>
-              <a:rPr lang="fr-FR" dirty="0" err="1" smtClean="0"/>
-              <a:t>less</a:t>
-            </a:r>
-            <a:r>
-              <a:rPr lang="fr-FR" dirty="0" smtClean="0"/>
-              <a:t> </a:t>
-            </a:r>
-            <a:r>
-              <a:rPr lang="fr-FR" dirty="0" err="1" smtClean="0"/>
-              <a:t>well</a:t>
-            </a:r>
-            <a:r>
-              <a:rPr lang="fr-FR" dirty="0" smtClean="0"/>
-              <a:t>. </a:t>
-            </a:r>
-            <a:r>
-              <a:rPr lang="fr-FR" dirty="0" smtClean="0"/>
-              <a:t>For </a:t>
-            </a:r>
-            <a:r>
-              <a:rPr lang="fr-FR" dirty="0" err="1" smtClean="0"/>
-              <a:t>this</a:t>
-            </a:r>
-            <a:r>
-              <a:rPr lang="fr-FR" dirty="0" smtClean="0"/>
-              <a:t> </a:t>
-            </a:r>
-            <a:r>
-              <a:rPr lang="fr-FR" dirty="0" err="1" smtClean="0"/>
-              <a:t>reason</a:t>
-            </a:r>
-            <a:r>
-              <a:rPr lang="fr-FR" dirty="0" smtClean="0"/>
-              <a:t>, </a:t>
-            </a:r>
-            <a:r>
-              <a:rPr lang="fr-FR" dirty="0" err="1" smtClean="0"/>
-              <a:t>you</a:t>
-            </a:r>
-            <a:r>
-              <a:rPr lang="fr-FR" dirty="0" smtClean="0"/>
-              <a:t> </a:t>
-            </a:r>
-            <a:r>
-              <a:rPr lang="fr-FR" dirty="0" err="1" smtClean="0"/>
-              <a:t>will</a:t>
-            </a:r>
-            <a:r>
-              <a:rPr lang="fr-FR" dirty="0" smtClean="0"/>
-              <a:t> </a:t>
-            </a:r>
-            <a:r>
-              <a:rPr lang="fr-FR" dirty="0" err="1" smtClean="0"/>
-              <a:t>be</a:t>
-            </a:r>
-            <a:r>
-              <a:rPr lang="fr-FR" dirty="0" smtClean="0"/>
-              <a:t> able to </a:t>
-            </a:r>
-            <a:r>
-              <a:rPr lang="fr-FR" dirty="0" err="1" smtClean="0"/>
-              <a:t>give</a:t>
-            </a:r>
-            <a:r>
-              <a:rPr lang="fr-FR" dirty="0" smtClean="0"/>
-              <a:t> a </a:t>
-            </a:r>
-            <a:r>
-              <a:rPr lang="fr-FR" dirty="0" err="1" smtClean="0"/>
-              <a:t>finer</a:t>
-            </a:r>
-            <a:r>
-              <a:rPr lang="fr-FR" dirty="0" smtClean="0"/>
-              <a:t> </a:t>
-            </a:r>
-            <a:r>
-              <a:rPr lang="fr-FR" dirty="0" err="1" smtClean="0"/>
-              <a:t>jugdment</a:t>
-            </a:r>
-            <a:r>
-              <a:rPr lang="fr-FR" dirty="0" smtClean="0"/>
-              <a:t> </a:t>
-            </a:r>
-            <a:r>
-              <a:rPr lang="fr-FR" dirty="0" err="1" smtClean="0"/>
-              <a:t>than</a:t>
-            </a:r>
-            <a:r>
-              <a:rPr lang="fr-FR" dirty="0" smtClean="0"/>
-              <a:t> a simple ‘</a:t>
-            </a:r>
-            <a:r>
-              <a:rPr lang="fr-FR" dirty="0" err="1"/>
-              <a:t>T</a:t>
-            </a:r>
-            <a:r>
-              <a:rPr lang="fr-FR" dirty="0" err="1" smtClean="0"/>
-              <a:t>rue</a:t>
-            </a:r>
-            <a:r>
-              <a:rPr lang="fr-FR" dirty="0" smtClean="0"/>
-              <a:t>’ or ‘False’: </a:t>
-            </a:r>
-            <a:r>
-              <a:rPr lang="fr-FR" dirty="0" err="1" smtClean="0"/>
-              <a:t>you</a:t>
-            </a:r>
-            <a:r>
-              <a:rPr lang="fr-FR" dirty="0" smtClean="0"/>
-              <a:t> </a:t>
-            </a:r>
-            <a:r>
-              <a:rPr lang="fr-FR" dirty="0" err="1" smtClean="0"/>
-              <a:t>will</a:t>
-            </a:r>
-            <a:r>
-              <a:rPr lang="fr-FR" dirty="0" smtClean="0"/>
-              <a:t> </a:t>
-            </a:r>
-            <a:r>
-              <a:rPr lang="fr-FR" dirty="0" err="1" smtClean="0"/>
-              <a:t>give</a:t>
-            </a:r>
-            <a:r>
-              <a:rPr lang="fr-FR" dirty="0" smtClean="0"/>
-              <a:t> </a:t>
-            </a:r>
-            <a:r>
-              <a:rPr lang="fr-FR" dirty="0" err="1" smtClean="0"/>
-              <a:t>your</a:t>
-            </a:r>
-            <a:r>
-              <a:rPr lang="fr-FR" dirty="0" smtClean="0"/>
-              <a:t> </a:t>
-            </a:r>
-            <a:r>
-              <a:rPr lang="fr-FR" dirty="0" err="1" smtClean="0"/>
-              <a:t>answer</a:t>
-            </a:r>
-            <a:r>
-              <a:rPr lang="fr-FR" dirty="0"/>
-              <a:t> </a:t>
-            </a:r>
-            <a:r>
-              <a:rPr lang="fr-FR" dirty="0" err="1" smtClean="0"/>
-              <a:t>along</a:t>
-            </a:r>
-            <a:r>
-              <a:rPr lang="fr-FR" dirty="0" smtClean="0"/>
-              <a:t> </a:t>
-            </a:r>
-            <a:r>
-              <a:rPr lang="fr-FR" dirty="0"/>
-              <a:t>a continuum of </a:t>
-            </a:r>
-            <a:r>
-              <a:rPr lang="fr-FR" dirty="0" err="1"/>
-              <a:t>answers</a:t>
-            </a:r>
-            <a:r>
-              <a:rPr lang="fr-FR" dirty="0"/>
-              <a:t>, by setting </a:t>
-            </a:r>
-            <a:r>
-              <a:rPr lang="fr-FR" dirty="0" err="1"/>
-              <a:t>with</a:t>
-            </a:r>
-            <a:r>
-              <a:rPr lang="fr-FR" dirty="0"/>
-              <a:t> </a:t>
-            </a:r>
-            <a:r>
-              <a:rPr lang="fr-FR" dirty="0" smtClean="0"/>
-              <a:t>the </a:t>
-            </a:r>
-            <a:r>
-              <a:rPr lang="fr-FR" dirty="0" err="1"/>
-              <a:t>cursor</a:t>
-            </a:r>
-            <a:r>
-              <a:rPr lang="fr-FR" dirty="0"/>
-              <a:t> the right end of a </a:t>
-            </a:r>
-            <a:r>
-              <a:rPr lang="fr-FR" dirty="0" err="1"/>
-              <a:t>red</a:t>
-            </a:r>
-            <a:r>
-              <a:rPr lang="fr-FR" dirty="0"/>
-              <a:t> line </a:t>
-            </a:r>
-            <a:r>
-              <a:rPr lang="fr-FR" dirty="0" err="1"/>
-              <a:t>going</a:t>
-            </a:r>
-            <a:r>
-              <a:rPr lang="fr-FR" dirty="0"/>
-              <a:t> </a:t>
-            </a:r>
-            <a:r>
-              <a:rPr lang="fr-FR" dirty="0" err="1"/>
-              <a:t>between</a:t>
-            </a:r>
-            <a:r>
-              <a:rPr lang="fr-FR" dirty="0"/>
-              <a:t> </a:t>
-            </a:r>
-            <a:r>
-              <a:rPr lang="fr-FR" dirty="0" smtClean="0"/>
-              <a:t>‘False’ </a:t>
-            </a:r>
-            <a:r>
-              <a:rPr lang="fr-FR" dirty="0"/>
-              <a:t>(to the </a:t>
-            </a:r>
-            <a:r>
-              <a:rPr lang="fr-FR" dirty="0" err="1"/>
-              <a:t>left</a:t>
-            </a:r>
-            <a:r>
-              <a:rPr lang="fr-FR" dirty="0"/>
-              <a:t>) to </a:t>
-            </a:r>
-            <a:r>
-              <a:rPr lang="fr-FR" dirty="0" smtClean="0"/>
-              <a:t>‘</a:t>
-            </a:r>
-            <a:r>
-              <a:rPr lang="fr-FR" dirty="0" err="1" smtClean="0"/>
-              <a:t>True</a:t>
-            </a:r>
-            <a:r>
-              <a:rPr lang="fr-FR" dirty="0" smtClean="0"/>
-              <a:t>’ </a:t>
-            </a:r>
-            <a:r>
-              <a:rPr lang="fr-FR" dirty="0"/>
-              <a:t>(to the right</a:t>
-            </a:r>
-            <a:r>
-              <a:rPr lang="fr-FR" dirty="0" smtClean="0"/>
-              <a:t>). The more the sentence </a:t>
-            </a:r>
-            <a:r>
-              <a:rPr lang="fr-FR" dirty="0" err="1" smtClean="0"/>
-              <a:t>will</a:t>
-            </a:r>
-            <a:r>
-              <a:rPr lang="fr-FR" dirty="0" smtClean="0"/>
-              <a:t> </a:t>
-            </a:r>
-            <a:r>
-              <a:rPr lang="fr-FR" dirty="0" err="1" smtClean="0"/>
-              <a:t>seem</a:t>
-            </a:r>
-            <a:r>
-              <a:rPr lang="fr-FR" dirty="0" smtClean="0"/>
-              <a:t> to </a:t>
-            </a:r>
-            <a:r>
-              <a:rPr lang="fr-FR" dirty="0" err="1" smtClean="0"/>
-              <a:t>be</a:t>
-            </a:r>
-            <a:r>
-              <a:rPr lang="fr-FR" dirty="0" smtClean="0"/>
-              <a:t> a good description of the </a:t>
-            </a:r>
-            <a:r>
-              <a:rPr lang="fr-FR" dirty="0" err="1" smtClean="0"/>
-              <a:t>picture</a:t>
-            </a:r>
-            <a:r>
-              <a:rPr lang="fr-FR" dirty="0" smtClean="0"/>
-              <a:t>, the more </a:t>
-            </a:r>
-            <a:r>
-              <a:rPr lang="fr-FR" dirty="0" err="1" smtClean="0"/>
-              <a:t>you</a:t>
-            </a:r>
-            <a:r>
-              <a:rPr lang="fr-FR" dirty="0" smtClean="0"/>
-              <a:t> </a:t>
-            </a:r>
-            <a:r>
-              <a:rPr lang="fr-FR" dirty="0" err="1" smtClean="0"/>
-              <a:t>will</a:t>
-            </a:r>
-            <a:r>
-              <a:rPr lang="fr-FR" dirty="0" smtClean="0"/>
-              <a:t> move the end of the </a:t>
-            </a:r>
-            <a:r>
-              <a:rPr lang="fr-FR" dirty="0" err="1" smtClean="0"/>
-              <a:t>red</a:t>
-            </a:r>
-            <a:r>
-              <a:rPr lang="fr-FR" dirty="0" smtClean="0"/>
-              <a:t> line to ‘</a:t>
-            </a:r>
-            <a:r>
-              <a:rPr lang="fr-FR" dirty="0" err="1" smtClean="0"/>
-              <a:t>True</a:t>
-            </a:r>
-            <a:r>
-              <a:rPr lang="fr-FR" dirty="0" smtClean="0"/>
-              <a:t>’. It </a:t>
-            </a:r>
-            <a:r>
-              <a:rPr lang="fr-FR" dirty="0" err="1" smtClean="0"/>
-              <a:t>should</a:t>
-            </a:r>
-            <a:r>
-              <a:rPr lang="fr-FR" dirty="0" smtClean="0"/>
-              <a:t> </a:t>
-            </a:r>
-            <a:r>
-              <a:rPr lang="fr-FR" dirty="0" err="1" smtClean="0"/>
-              <a:t>be</a:t>
-            </a:r>
-            <a:r>
-              <a:rPr lang="fr-FR" dirty="0" smtClean="0"/>
-              <a:t> the case for an </a:t>
-            </a:r>
-            <a:r>
-              <a:rPr lang="fr-FR" dirty="0" err="1" smtClean="0"/>
-              <a:t>example</a:t>
-            </a:r>
-            <a:r>
-              <a:rPr lang="fr-FR" dirty="0" smtClean="0"/>
-              <a:t> </a:t>
-            </a:r>
-            <a:r>
-              <a:rPr lang="fr-FR" dirty="0" err="1" smtClean="0"/>
-              <a:t>like</a:t>
-            </a:r>
-            <a:r>
-              <a:rPr lang="fr-FR" dirty="0" smtClean="0"/>
-              <a:t> the one </a:t>
-            </a:r>
-            <a:r>
-              <a:rPr lang="fr-FR" dirty="0" err="1" smtClean="0"/>
-              <a:t>above</a:t>
-            </a:r>
-            <a:r>
-              <a:rPr lang="fr-FR" dirty="0" smtClean="0"/>
-              <a:t>, and </a:t>
-            </a:r>
-            <a:r>
-              <a:rPr lang="fr-FR" dirty="0" err="1" smtClean="0"/>
-              <a:t>thus</a:t>
-            </a:r>
-            <a:r>
-              <a:rPr lang="fr-FR" dirty="0" smtClean="0"/>
-              <a:t> </a:t>
-            </a:r>
-            <a:r>
-              <a:rPr lang="fr-FR" dirty="0" err="1" smtClean="0"/>
-              <a:t>your</a:t>
-            </a:r>
-            <a:r>
-              <a:rPr lang="fr-FR" dirty="0" smtClean="0"/>
-              <a:t> </a:t>
-            </a:r>
-            <a:r>
-              <a:rPr lang="fr-FR" dirty="0" err="1" smtClean="0"/>
-              <a:t>answer</a:t>
-            </a:r>
-            <a:r>
-              <a:rPr lang="fr-FR" dirty="0" smtClean="0"/>
-              <a:t> </a:t>
-            </a:r>
-            <a:r>
-              <a:rPr lang="fr-FR" dirty="0" err="1" smtClean="0"/>
-              <a:t>should</a:t>
-            </a:r>
-            <a:r>
-              <a:rPr lang="fr-FR" dirty="0" smtClean="0"/>
-              <a:t> look </a:t>
-            </a:r>
-            <a:r>
-              <a:rPr lang="fr-FR" dirty="0" err="1" smtClean="0"/>
-              <a:t>like</a:t>
-            </a:r>
-            <a:r>
-              <a:rPr lang="fr-FR" dirty="0" smtClean="0"/>
-              <a:t> </a:t>
-            </a:r>
-            <a:r>
-              <a:rPr lang="fr-FR" dirty="0" err="1" smtClean="0"/>
-              <a:t>what</a:t>
-            </a:r>
-            <a:r>
-              <a:rPr lang="fr-FR" dirty="0" smtClean="0"/>
-              <a:t> </a:t>
-            </a:r>
-            <a:r>
-              <a:rPr lang="fr-FR" dirty="0" err="1" smtClean="0"/>
-              <a:t>you</a:t>
-            </a:r>
-            <a:r>
-              <a:rPr lang="fr-FR" dirty="0" smtClean="0"/>
-              <a:t> </a:t>
-            </a:r>
-            <a:r>
-              <a:rPr lang="fr-FR" dirty="0" err="1" smtClean="0"/>
-              <a:t>see</a:t>
-            </a:r>
-            <a:r>
-              <a:rPr lang="fr-FR" dirty="0" smtClean="0"/>
-              <a:t>. </a:t>
-            </a:r>
-            <a:r>
-              <a:rPr lang="fr-FR" dirty="0" err="1" smtClean="0"/>
-              <a:t>Conversely</a:t>
-            </a:r>
-            <a:r>
-              <a:rPr lang="fr-FR" dirty="0" smtClean="0"/>
-              <a:t>, if the sentence </a:t>
-            </a:r>
-            <a:r>
-              <a:rPr lang="fr-FR" dirty="0" err="1" smtClean="0"/>
-              <a:t>sounds</a:t>
-            </a:r>
-            <a:r>
-              <a:rPr lang="fr-FR" dirty="0" smtClean="0"/>
-              <a:t> </a:t>
-            </a:r>
-            <a:r>
-              <a:rPr lang="fr-FR" dirty="0" err="1" smtClean="0"/>
-              <a:t>rather</a:t>
-            </a:r>
-            <a:r>
-              <a:rPr lang="fr-FR" dirty="0" smtClean="0"/>
-              <a:t> </a:t>
-            </a:r>
-            <a:r>
-              <a:rPr lang="fr-FR" dirty="0" err="1" smtClean="0"/>
-              <a:t>inappropriate</a:t>
-            </a:r>
-            <a:r>
-              <a:rPr lang="fr-FR" dirty="0" smtClean="0"/>
-              <a:t>, </a:t>
-            </a:r>
-            <a:r>
-              <a:rPr lang="fr-FR" dirty="0" err="1" smtClean="0"/>
-              <a:t>you</a:t>
-            </a:r>
-            <a:r>
-              <a:rPr lang="fr-FR" dirty="0" smtClean="0"/>
-              <a:t> </a:t>
-            </a:r>
-            <a:r>
-              <a:rPr lang="fr-FR" dirty="0" err="1" smtClean="0"/>
-              <a:t>will</a:t>
-            </a:r>
-            <a:r>
-              <a:rPr lang="fr-FR" dirty="0" smtClean="0"/>
-              <a:t> move the </a:t>
-            </a:r>
-            <a:r>
-              <a:rPr lang="fr-FR" dirty="0" err="1" smtClean="0"/>
-              <a:t>red</a:t>
-            </a:r>
-            <a:r>
-              <a:rPr lang="fr-FR" dirty="0" smtClean="0"/>
-              <a:t> line to the </a:t>
-            </a:r>
-            <a:r>
-              <a:rPr lang="fr-FR" dirty="0" err="1" smtClean="0"/>
-              <a:t>left</a:t>
-            </a:r>
-            <a:r>
-              <a:rPr lang="fr-FR" dirty="0" smtClean="0"/>
-              <a:t>, </a:t>
-            </a:r>
-            <a:r>
-              <a:rPr lang="fr-FR" dirty="0" err="1" smtClean="0"/>
-              <a:t>that</a:t>
-            </a:r>
-            <a:r>
-              <a:rPr lang="fr-FR" dirty="0" smtClean="0"/>
-              <a:t> </a:t>
-            </a:r>
-            <a:r>
-              <a:rPr lang="fr-FR" dirty="0" err="1" smtClean="0"/>
-              <a:t>is</a:t>
-            </a:r>
-            <a:r>
-              <a:rPr lang="fr-FR" dirty="0" smtClean="0"/>
-              <a:t> to ‘False’. </a:t>
-            </a:r>
-          </a:p>
-          <a:p>
-            <a:pPr algn="just"/>
-            <a:endParaRPr lang="fr-FR" sz="1000" dirty="0" smtClean="0"/>
-          </a:p>
-          <a:p>
-            <a:pPr algn="r"/>
-            <a:r>
-              <a:rPr lang="fr-FR" sz="2000" i="1" dirty="0" err="1" smtClean="0"/>
-              <a:t>Press</a:t>
-            </a:r>
-            <a:r>
-              <a:rPr lang="fr-FR" sz="2000" i="1" dirty="0" smtClean="0"/>
-              <a:t> SPACEBAR to </a:t>
-            </a:r>
-            <a:r>
-              <a:rPr lang="fr-FR" sz="2000" i="1" dirty="0" err="1" smtClean="0"/>
-              <a:t>read</a:t>
-            </a:r>
-            <a:r>
-              <a:rPr lang="fr-FR" sz="2000" i="1" dirty="0" smtClean="0"/>
-              <a:t> the </a:t>
-            </a:r>
-            <a:r>
-              <a:rPr lang="fr-FR" sz="2000" i="1" dirty="0" err="1" smtClean="0"/>
+              <a:rPr lang="fr-FR" sz="2000" b="1" i="1" dirty="0" err="1" smtClean="0"/>
               <a:t>rest</a:t>
             </a:r>
             <a:r>
-              <a:rPr lang="fr-FR" sz="2000" i="1" dirty="0" smtClean="0"/>
+              <a:rPr lang="fr-FR" sz="2000" b="1" i="1" dirty="0" smtClean="0"/>
               <a:t> of the instructions…</a:t>
             </a:r>
-            <a:endParaRPr lang="en-GB" sz="2000" i="1" dirty="0" smtClean="0"/>
+            <a:endParaRPr lang="en-GB" sz="2000" b="1" i="1" dirty="0" smtClean="0"/>
           </a:p>
           <a:p>
             <a:pPr algn="just"/>
@@ -5076,7 +4234,7 @@
         <p:spPr>
           <a:xfrm>
             <a:off x="107504" y="0"/>
-            <a:ext cx="8928992" cy="5724645"/>
+            <a:ext cx="8928992" cy="6247864"/>
           </a:xfrm>
           <a:prstGeom prst="rect">
             <a:avLst/>
@@ -5091,347 +4249,8 @@
             <a:endParaRPr lang="fr-FR" dirty="0" smtClean="0"/>
           </a:p>
           <a:p>
+            <a:pPr algn="just"/>
             <a:endParaRPr lang="fr-FR" dirty="0" smtClean="0"/>
-          </a:p>
-          <a:p>
-            <a:endParaRPr lang="en-GB" dirty="0" smtClean="0"/>
-          </a:p>
-          <a:p>
-            <a:r>
-              <a:rPr lang="en-GB" sz="2000" i="1" dirty="0" smtClean="0"/>
-              <a:t>To summarize</a:t>
-            </a:r>
-            <a:endParaRPr lang="en-GB" sz="2000" i="1" dirty="0" smtClean="0"/>
-          </a:p>
-          <a:p>
-            <a:pPr algn="just"/>
-            <a:endParaRPr lang="en-GB" sz="1000" dirty="0" smtClean="0"/>
-          </a:p>
-          <a:p>
-            <a:pPr algn="just"/>
-            <a:r>
-              <a:rPr lang="en-GB" dirty="0" smtClean="0"/>
-              <a:t>You might hesitate, but follow your </a:t>
-            </a:r>
-            <a:r>
-              <a:rPr lang="en-GB" dirty="0" smtClean="0"/>
-              <a:t>guts</a:t>
-            </a:r>
-            <a:r>
-              <a:rPr lang="en-GB" dirty="0" smtClean="0"/>
-              <a:t> and use all the possibilities offered by the red line to represent at best your intuition. Don’t look for a justification to your answer, or for an explanation regarding where your intuition could come from – </a:t>
-            </a:r>
-            <a:r>
-              <a:rPr lang="en-GB" b="1" dirty="0" smtClean="0"/>
-              <a:t>just answer as you feel it.</a:t>
-            </a:r>
-          </a:p>
-          <a:p>
-            <a:pPr algn="just"/>
-            <a:endParaRPr lang="en-GB" sz="1000" b="1" dirty="0" smtClean="0"/>
-          </a:p>
-          <a:p>
-            <a:pPr algn="just"/>
-            <a:endParaRPr lang="en-GB" sz="1000" b="1" dirty="0" smtClean="0"/>
-          </a:p>
-          <a:p>
-            <a:pPr algn="just"/>
-            <a:r>
-              <a:rPr lang="fr-FR" dirty="0" smtClean="0"/>
-              <a:t>This </a:t>
-            </a:r>
-            <a:r>
-              <a:rPr lang="fr-FR" dirty="0" err="1" smtClean="0"/>
-              <a:t>study</a:t>
-            </a:r>
-            <a:r>
-              <a:rPr lang="fr-FR" dirty="0" smtClean="0"/>
-              <a:t> </a:t>
-            </a:r>
-            <a:r>
-              <a:rPr lang="fr-FR" dirty="0" err="1" smtClean="0"/>
-              <a:t>is</a:t>
-            </a:r>
-            <a:r>
-              <a:rPr lang="fr-FR" dirty="0" smtClean="0"/>
-              <a:t> not long, but a bit </a:t>
-            </a:r>
-            <a:r>
-              <a:rPr lang="fr-FR" dirty="0" err="1" smtClean="0"/>
-              <a:t>repetitive</a:t>
-            </a:r>
-            <a:r>
-              <a:rPr lang="fr-FR" dirty="0"/>
-              <a:t> </a:t>
-            </a:r>
-            <a:r>
-              <a:rPr lang="fr-FR" dirty="0" smtClean="0"/>
-              <a:t>and</a:t>
-            </a:r>
-            <a:r>
-              <a:rPr lang="fr-FR" dirty="0" smtClean="0"/>
-              <a:t> </a:t>
-            </a:r>
-            <a:r>
-              <a:rPr lang="fr-FR" dirty="0" err="1"/>
-              <a:t>y</a:t>
-            </a:r>
-            <a:r>
-              <a:rPr lang="fr-FR" dirty="0" err="1" smtClean="0"/>
-              <a:t>ou</a:t>
-            </a:r>
-            <a:r>
-              <a:rPr lang="fr-FR" dirty="0" smtClean="0"/>
-              <a:t> must </a:t>
-            </a:r>
-            <a:r>
-              <a:rPr lang="fr-FR" dirty="0" err="1" smtClean="0"/>
-              <a:t>stay</a:t>
-            </a:r>
-            <a:r>
-              <a:rPr lang="fr-FR" dirty="0" smtClean="0"/>
-              <a:t> </a:t>
-            </a:r>
-            <a:r>
-              <a:rPr lang="fr-FR" dirty="0" err="1" smtClean="0"/>
-              <a:t>focused</a:t>
-            </a:r>
-            <a:r>
-              <a:rPr lang="fr-FR" dirty="0" smtClean="0"/>
-              <a:t>. </a:t>
-            </a:r>
-            <a:r>
-              <a:rPr lang="fr-FR" dirty="0" err="1" smtClean="0"/>
-              <a:t>Even</a:t>
-            </a:r>
-            <a:r>
-              <a:rPr lang="fr-FR" dirty="0" smtClean="0"/>
-              <a:t> </a:t>
-            </a:r>
-            <a:r>
-              <a:rPr lang="fr-FR" dirty="0" err="1" smtClean="0"/>
-              <a:t>though</a:t>
-            </a:r>
-            <a:r>
-              <a:rPr lang="fr-FR" dirty="0" smtClean="0"/>
-              <a:t> </a:t>
-            </a:r>
-            <a:r>
-              <a:rPr lang="fr-FR" dirty="0" err="1" smtClean="0"/>
-              <a:t>you</a:t>
-            </a:r>
-            <a:r>
-              <a:rPr lang="fr-FR" dirty="0" smtClean="0"/>
-              <a:t> have to </a:t>
-            </a:r>
-            <a:r>
-              <a:rPr lang="fr-FR" dirty="0" err="1" smtClean="0"/>
-              <a:t>pay</a:t>
-            </a:r>
-            <a:r>
-              <a:rPr lang="fr-FR" dirty="0" smtClean="0"/>
-              <a:t> attention to </a:t>
-            </a:r>
-            <a:r>
-              <a:rPr lang="fr-FR" dirty="0" err="1" smtClean="0"/>
-              <a:t>every</a:t>
-            </a:r>
-            <a:r>
-              <a:rPr lang="fr-FR" dirty="0" smtClean="0"/>
-              <a:t> </a:t>
-            </a:r>
-            <a:r>
-              <a:rPr lang="fr-FR" dirty="0" err="1" smtClean="0"/>
-              <a:t>detail</a:t>
-            </a:r>
-            <a:r>
-              <a:rPr lang="fr-FR" dirty="0" smtClean="0"/>
-              <a:t>, </a:t>
-            </a:r>
-            <a:r>
-              <a:rPr lang="fr-FR" dirty="0" err="1" smtClean="0"/>
-              <a:t>don’t</a:t>
-            </a:r>
-            <a:r>
-              <a:rPr lang="fr-FR" dirty="0" smtClean="0"/>
-              <a:t> </a:t>
-            </a:r>
-            <a:r>
-              <a:rPr lang="fr-FR" dirty="0" err="1" smtClean="0"/>
-              <a:t>spend</a:t>
-            </a:r>
-            <a:r>
-              <a:rPr lang="fr-FR" dirty="0" smtClean="0"/>
-              <a:t> </a:t>
-            </a:r>
-            <a:r>
-              <a:rPr lang="fr-FR" dirty="0" err="1" smtClean="0"/>
-              <a:t>too</a:t>
-            </a:r>
-            <a:r>
-              <a:rPr lang="fr-FR" dirty="0" smtClean="0"/>
-              <a:t> </a:t>
-            </a:r>
-            <a:r>
-              <a:rPr lang="fr-FR" dirty="0" err="1" smtClean="0"/>
-              <a:t>much</a:t>
-            </a:r>
-            <a:r>
-              <a:rPr lang="fr-FR" dirty="0" smtClean="0"/>
-              <a:t> time on </a:t>
-            </a:r>
-            <a:r>
-              <a:rPr lang="fr-FR" dirty="0" err="1" smtClean="0"/>
-              <a:t>every</a:t>
-            </a:r>
-            <a:r>
-              <a:rPr lang="fr-FR" dirty="0" smtClean="0"/>
-              <a:t> sentence. </a:t>
-            </a:r>
-            <a:r>
-              <a:rPr lang="fr-FR" dirty="0"/>
-              <a:t>R</a:t>
-            </a:r>
-            <a:r>
-              <a:rPr lang="fr-FR" dirty="0" smtClean="0"/>
-              <a:t>ead the sentence in </a:t>
-            </a:r>
-            <a:r>
-              <a:rPr lang="fr-FR" dirty="0" err="1" smtClean="0"/>
-              <a:t>your</a:t>
-            </a:r>
-            <a:r>
-              <a:rPr lang="fr-FR" dirty="0" smtClean="0"/>
-              <a:t> </a:t>
-            </a:r>
-            <a:r>
-              <a:rPr lang="fr-FR" dirty="0" err="1" smtClean="0"/>
-              <a:t>head</a:t>
-            </a:r>
-            <a:r>
-              <a:rPr lang="fr-FR" dirty="0" smtClean="0"/>
-              <a:t> and, </a:t>
-            </a:r>
-            <a:r>
-              <a:rPr lang="fr-FR" dirty="0" err="1" smtClean="0"/>
-              <a:t>given</a:t>
-            </a:r>
-            <a:r>
-              <a:rPr lang="fr-FR" dirty="0" smtClean="0"/>
-              <a:t> </a:t>
-            </a:r>
-            <a:r>
-              <a:rPr lang="fr-FR" dirty="0" err="1" smtClean="0"/>
-              <a:t>what</a:t>
-            </a:r>
-            <a:r>
-              <a:rPr lang="fr-FR" dirty="0" smtClean="0"/>
-              <a:t> </a:t>
-            </a:r>
-            <a:r>
-              <a:rPr lang="fr-FR" dirty="0" err="1" smtClean="0"/>
-              <a:t>you</a:t>
-            </a:r>
-            <a:r>
-              <a:rPr lang="fr-FR" dirty="0" smtClean="0"/>
-              <a:t> </a:t>
-            </a:r>
-            <a:r>
-              <a:rPr lang="fr-FR" dirty="0" err="1" smtClean="0"/>
-              <a:t>see</a:t>
-            </a:r>
-            <a:r>
-              <a:rPr lang="fr-FR" dirty="0" smtClean="0"/>
-              <a:t> on the </a:t>
-            </a:r>
-            <a:r>
-              <a:rPr lang="fr-FR" dirty="0" err="1" smtClean="0"/>
-              <a:t>picture</a:t>
-            </a:r>
-            <a:r>
-              <a:rPr lang="fr-FR" dirty="0" smtClean="0"/>
-              <a:t>, tell us </a:t>
-            </a:r>
-            <a:r>
-              <a:rPr lang="fr-FR" dirty="0" err="1" smtClean="0"/>
-              <a:t>your</a:t>
-            </a:r>
-            <a:r>
-              <a:rPr lang="fr-FR" dirty="0" smtClean="0"/>
-              <a:t> intuition </a:t>
-            </a:r>
-            <a:r>
-              <a:rPr lang="fr-FR" dirty="0" err="1" smtClean="0"/>
-              <a:t>using</a:t>
-            </a:r>
-            <a:r>
-              <a:rPr lang="fr-FR" dirty="0" smtClean="0"/>
-              <a:t> the </a:t>
-            </a:r>
-            <a:r>
-              <a:rPr lang="fr-FR" dirty="0" err="1" smtClean="0"/>
-              <a:t>red</a:t>
-            </a:r>
-            <a:r>
-              <a:rPr lang="fr-FR" dirty="0" smtClean="0"/>
-              <a:t> </a:t>
-            </a:r>
-            <a:r>
-              <a:rPr lang="fr-FR" dirty="0" err="1" smtClean="0"/>
-              <a:t>answer</a:t>
-            </a:r>
-            <a:r>
-              <a:rPr lang="fr-FR" dirty="0" smtClean="0"/>
-              <a:t> bar. You </a:t>
-            </a:r>
-            <a:r>
-              <a:rPr lang="fr-FR" dirty="0" err="1" smtClean="0"/>
-              <a:t>will</a:t>
-            </a:r>
-            <a:r>
-              <a:rPr lang="fr-FR" dirty="0" smtClean="0"/>
-              <a:t> </a:t>
-            </a:r>
-            <a:r>
-              <a:rPr lang="fr-FR" dirty="0" err="1" smtClean="0"/>
-              <a:t>get</a:t>
-            </a:r>
-            <a:r>
-              <a:rPr lang="fr-FR" dirty="0" smtClean="0"/>
-              <a:t> </a:t>
-            </a:r>
-            <a:r>
-              <a:rPr lang="fr-FR" dirty="0" err="1" smtClean="0"/>
-              <a:t>used</a:t>
-            </a:r>
-            <a:r>
-              <a:rPr lang="fr-FR" dirty="0" smtClean="0"/>
-              <a:t> to </a:t>
-            </a:r>
-            <a:r>
-              <a:rPr lang="fr-FR" dirty="0" err="1" smtClean="0"/>
-              <a:t>this</a:t>
-            </a:r>
-            <a:r>
-              <a:rPr lang="fr-FR" dirty="0" smtClean="0"/>
-              <a:t> bar </a:t>
-            </a:r>
-            <a:r>
-              <a:rPr lang="fr-FR" dirty="0" err="1" smtClean="0"/>
-              <a:t>very</a:t>
-            </a:r>
-            <a:r>
-              <a:rPr lang="fr-FR" dirty="0" smtClean="0"/>
-              <a:t> </a:t>
-            </a:r>
-            <a:r>
-              <a:rPr lang="fr-FR" dirty="0" err="1" smtClean="0"/>
-              <a:t>quickly</a:t>
-            </a:r>
-            <a:r>
-              <a:rPr lang="fr-FR" dirty="0" smtClean="0"/>
-              <a:t>.   </a:t>
-            </a:r>
           </a:p>
           <a:p>
             <a:pPr algn="just"/>
@@ -5440,14 +4259,74 @@
           <a:p>
             <a:pPr algn="just"/>
             <a:r>
-              <a:rPr lang="en-GB" dirty="0" smtClean="0"/>
-              <a:t>Sentences will sometimes look the same. </a:t>
-            </a:r>
-            <a:r>
-              <a:rPr lang="en-GB" dirty="0" smtClean="0"/>
-              <a:t>That doesn’t matter. Answer every time following your intuition, independently of your previous answers. </a:t>
-            </a:r>
-            <a:endParaRPr lang="en-GB" dirty="0" smtClean="0"/>
+              <a:rPr lang="en-US" sz="2000" dirty="0" smtClean="0"/>
+              <a:t>Some </a:t>
+            </a:r>
+            <a:r>
+              <a:rPr lang="en-US" sz="2000" dirty="0"/>
+              <a:t>further notes</a:t>
+            </a:r>
+            <a:r>
+              <a:rPr lang="en-US" sz="2000" dirty="0" smtClean="0"/>
+              <a:t>:</a:t>
+            </a:r>
+          </a:p>
+          <a:p>
+            <a:pPr algn="just"/>
+            <a:endParaRPr lang="en-US" sz="2000" dirty="0"/>
+          </a:p>
+          <a:p>
+            <a:pPr algn="just"/>
+            <a:r>
+              <a:rPr lang="en-US" sz="2000" dirty="0"/>
+              <a:t>You may hesitate, but it's OK to go with your gut, and to use the full range of the red bar when appropriate. Don’t worry about justifying or explaining your answers: we're interested in finding out precisely what the answer feels like to you</a:t>
+            </a:r>
+            <a:r>
+              <a:rPr lang="en-US" sz="2000" dirty="0" smtClean="0"/>
+              <a:t>.</a:t>
+            </a:r>
+          </a:p>
+          <a:p>
+            <a:pPr algn="just"/>
+            <a:endParaRPr lang="en-US" sz="2000" dirty="0"/>
+          </a:p>
+          <a:p>
+            <a:pPr algn="just"/>
+            <a:r>
+              <a:rPr lang="en-US" sz="2000" dirty="0"/>
+              <a:t>This study is not long, but it is slightly repetitive and you must maintain concentration. Even though you have to pay attention to detail, don’t spend too much time on each sentence: just read it in your head and  tell us your intuition</a:t>
+            </a:r>
+            <a:r>
+              <a:rPr lang="en-US" sz="2000" dirty="0" smtClean="0"/>
+              <a:t>.</a:t>
+            </a:r>
+          </a:p>
+          <a:p>
+            <a:pPr algn="just"/>
+            <a:endParaRPr lang="en-US" sz="2000" dirty="0"/>
+          </a:p>
+          <a:p>
+            <a:pPr algn="just"/>
+            <a:r>
+              <a:rPr lang="en-US" sz="2000" dirty="0"/>
+              <a:t>Sometimes sentences will sometimes look the same. That's OK – just answer each time according to your feeling, without worrying about what your previous answers were. </a:t>
+            </a:r>
+          </a:p>
+          <a:p>
+            <a:pPr algn="just"/>
+            <a:endParaRPr lang="en-US" sz="2000" dirty="0" smtClean="0"/>
+          </a:p>
+          <a:p>
+            <a:pPr algn="just"/>
+            <a:r>
+              <a:rPr lang="en-US" sz="2000" dirty="0" smtClean="0"/>
+              <a:t>Thanks </a:t>
+            </a:r>
+            <a:r>
+              <a:rPr lang="en-US" sz="2000" dirty="0"/>
+              <a:t>for participating!</a:t>
+            </a:r>
+            <a:endParaRPr lang="fr-FR" dirty="0" smtClean="0"/>
           </a:p>
           <a:p>
             <a:pPr algn="just"/>
@@ -5455,52 +4334,48 @@
           </a:p>
           <a:p>
             <a:pPr algn="just"/>
-            <a:endParaRPr lang="fr-FR" dirty="0" smtClean="0"/>
-          </a:p>
-          <a:p>
-            <a:pPr algn="just"/>
             <a:endParaRPr lang="fr-FR" sz="1000" dirty="0" smtClean="0"/>
           </a:p>
           <a:p>
-            <a:pPr algn="ctr"/>
-            <a:r>
-              <a:rPr lang="fr-FR" sz="2000" i="1" dirty="0" err="1" smtClean="0"/>
+            <a:pPr algn="r"/>
+            <a:r>
+              <a:rPr lang="fr-FR" sz="2000" b="1" i="1" dirty="0" err="1" smtClean="0"/>
               <a:t>Press</a:t>
             </a:r>
             <a:r>
-              <a:rPr lang="fr-FR" sz="2000" i="1" dirty="0" smtClean="0"/>
+              <a:rPr lang="fr-FR" sz="2000" b="1" i="1" dirty="0" smtClean="0"/>
               <a:t> SPACEBAR </a:t>
             </a:r>
             <a:r>
-              <a:rPr lang="fr-FR" sz="2000" i="1" dirty="0" err="1" smtClean="0"/>
+              <a:rPr lang="fr-FR" sz="2000" b="1" i="1" dirty="0" err="1" smtClean="0"/>
               <a:t>when</a:t>
             </a:r>
             <a:r>
-              <a:rPr lang="fr-FR" sz="2000" i="1" dirty="0" smtClean="0"/>
+              <a:rPr lang="fr-FR" sz="2000" b="1" i="1" dirty="0" smtClean="0"/>
               <a:t> </a:t>
             </a:r>
             <a:r>
-              <a:rPr lang="fr-FR" sz="2000" i="1" dirty="0" err="1" smtClean="0"/>
+              <a:rPr lang="fr-FR" sz="2000" b="1" i="1" dirty="0" err="1" smtClean="0"/>
               <a:t>you</a:t>
             </a:r>
             <a:r>
-              <a:rPr lang="fr-FR" sz="2000" i="1" dirty="0" smtClean="0"/>
+              <a:rPr lang="fr-FR" sz="2000" b="1" i="1" dirty="0" smtClean="0"/>
               <a:t> are </a:t>
             </a:r>
             <a:r>
-              <a:rPr lang="fr-FR" sz="2000" i="1" dirty="0" err="1" smtClean="0"/>
+              <a:rPr lang="fr-FR" sz="2000" b="1" i="1" dirty="0" err="1" smtClean="0"/>
               <a:t>ready</a:t>
             </a:r>
             <a:r>
-              <a:rPr lang="fr-FR" sz="2000" i="1" dirty="0" smtClean="0"/>
+              <a:rPr lang="fr-FR" sz="2000" b="1" i="1" dirty="0" smtClean="0"/>
               <a:t> to </a:t>
             </a:r>
             <a:r>
-              <a:rPr lang="fr-FR" sz="2000" i="1" dirty="0" err="1" smtClean="0"/>
+              <a:rPr lang="fr-FR" sz="2000" b="1" i="1" dirty="0" err="1" smtClean="0"/>
               <a:t>start</a:t>
             </a:r>
             <a:r>
-              <a:rPr lang="fr-FR" sz="2000" i="1" dirty="0" smtClean="0"/>
+              <a:rPr lang="fr-FR" sz="2000" b="1" i="1" dirty="0" smtClean="0"/>
               <a:t>…</a:t>
             </a:r>
             <a:endParaRPr lang="fr-FR" b="1" dirty="0" smtClean="0"/>
@@ -5511,96 +4386,6 @@
         </p:txBody>
       </p:sp>
     </p:spTree>
-  </p:cSld>
-  <p:clrMapOvr>
-    <a:masterClrMapping/>
-  </p:clrMapOvr>
-  <p:timing>
-    <p:tnLst>
-      <p:par>
-        <p:cTn xmlns:p14="http://schemas.microsoft.com/office/powerpoint/2010/main" id="1" dur="indefinite" restart="never" nodeType="tmRoot"/>
-      </p:par>
-    </p:tnLst>
-  </p:timing>
-</p:sld>
-</file>
-
-<file path=ppt/slides/slide3.xml><?xml version="1.0" encoding="utf-8"?>
-<p:sld xmlns:a="http://schemas.openxmlformats.org/drawingml/2006/main" xmlns:r="http://schemas.openxmlformats.org/officeDocument/2006/relationships" xmlns:p="http://schemas.openxmlformats.org/presentationml/2006/main">
-  <p:cSld>
-    <p:spTree>
-      <p:nvGrpSpPr>
-        <p:cNvPr id="1" name=""/>
-        <p:cNvGrpSpPr/>
-        <p:nvPr/>
-      </p:nvGrpSpPr>
-      <p:grpSpPr>
-        <a:xfrm>
-          <a:off x="0" y="0"/>
-          <a:ext cx="0" cy="0"/>
-          <a:chOff x="0" y="0"/>
-          <a:chExt cx="0" cy="0"/>
-        </a:xfrm>
-      </p:grpSpPr>
-      <p:pic>
-        <p:nvPicPr>
-          <p:cNvPr id="2" name="Picture 1"/>
-          <p:cNvPicPr>
-            <a:picLocks noChangeAspect="1"/>
-          </p:cNvPicPr>
-          <p:nvPr/>
-        </p:nvPicPr>
-        <p:blipFill>
-          <a:blip r:embed="rId2"/>
-          <a:stretch>
-            <a:fillRect/>
-          </a:stretch>
-        </p:blipFill>
-        <p:spPr>
-          <a:xfrm>
-            <a:off x="3779912" y="1700808"/>
-            <a:ext cx="2048272" cy="2200961"/>
-          </a:xfrm>
-          <a:prstGeom prst="rect">
-            <a:avLst/>
-          </a:prstGeom>
-          <a:solidFill>
-            <a:srgbClr val="FFFFFF">
-              <a:shade val="85000"/>
-            </a:srgbClr>
-          </a:solidFill>
-          <a:ln w="190500" cap="rnd">
-            <a:solidFill>
-              <a:srgbClr val="FFFFFF"/>
-            </a:solidFill>
-          </a:ln>
-          <a:effectLst>
-            <a:outerShdw blurRad="50000" algn="tl" rotWithShape="0">
-              <a:srgbClr val="000000">
-                <a:alpha val="41000"/>
-              </a:srgbClr>
-            </a:outerShdw>
-          </a:effectLst>
-          <a:scene3d>
-            <a:camera prst="orthographicFront"/>
-            <a:lightRig rig="twoPt" dir="t">
-              <a:rot lat="0" lon="0" rev="7800000"/>
-            </a:lightRig>
-          </a:scene3d>
-          <a:sp3d contourW="6350">
-            <a:bevelT w="50800" h="16510"/>
-            <a:contourClr>
-              <a:srgbClr val="C0C0C0"/>
-            </a:contourClr>
-          </a:sp3d>
-        </p:spPr>
-      </p:pic>
-    </p:spTree>
-    <p:extLst>
-      <p:ext uri="{BB962C8B-B14F-4D97-AF65-F5344CB8AC3E}">
-        <p14:creationId xmlns:p14="http://schemas.microsoft.com/office/powerpoint/2010/main" val="878988788"/>
-      </p:ext>
-    </p:extLst>
   </p:cSld>
   <p:clrMapOvr>
     <a:masterClrMapping/>

</xml_diff>

<commit_message>
Ready for Wednesday: 1st lab session, 2-4pm
Final Lab Version
</commit_message>
<xml_diff>
--- a/instuctions_numerals.pptx
+++ b/instuctions_numerals.pptx
@@ -303,7 +303,7 @@
             <a:fld id="{AA309A6D-C09C-4548-B29A-6CF363A7E532}" type="datetimeFigureOut">
               <a:rPr lang="fr-FR" smtClean="0"/>
               <a:pPr/>
-              <a:t>11/7/13</a:t>
+              <a:t>11/18/13</a:t>
             </a:fld>
             <a:endParaRPr lang="fr-BE"/>
           </a:p>
@@ -658,7 +658,7 @@
             <a:fld id="{AA309A6D-C09C-4548-B29A-6CF363A7E532}" type="datetimeFigureOut">
               <a:rPr lang="fr-FR" smtClean="0"/>
               <a:pPr/>
-              <a:t>11/7/13</a:t>
+              <a:t>11/18/13</a:t>
             </a:fld>
             <a:endParaRPr lang="fr-BE"/>
           </a:p>
@@ -835,7 +835,7 @@
             <a:fld id="{AA309A6D-C09C-4548-B29A-6CF363A7E532}" type="datetimeFigureOut">
               <a:rPr lang="fr-FR" smtClean="0"/>
               <a:pPr/>
-              <a:t>11/7/13</a:t>
+              <a:t>11/18/13</a:t>
             </a:fld>
             <a:endParaRPr lang="fr-BE"/>
           </a:p>
@@ -950,7 +950,7 @@
             <a:fld id="{AA309A6D-C09C-4548-B29A-6CF363A7E532}" type="datetimeFigureOut">
               <a:rPr lang="fr-FR" smtClean="0"/>
               <a:pPr/>
-              <a:t>11/7/13</a:t>
+              <a:t>11/18/13</a:t>
             </a:fld>
             <a:endParaRPr lang="fr-BE"/>
           </a:p>
@@ -1310,7 +1310,7 @@
             <a:fld id="{AA309A6D-C09C-4548-B29A-6CF363A7E532}" type="datetimeFigureOut">
               <a:rPr lang="fr-FR" smtClean="0"/>
               <a:pPr/>
-              <a:t>11/7/13</a:t>
+              <a:t>11/18/13</a:t>
             </a:fld>
             <a:endParaRPr lang="fr-BE"/>
           </a:p>
@@ -1577,7 +1577,7 @@
             <a:fld id="{AA309A6D-C09C-4548-B29A-6CF363A7E532}" type="datetimeFigureOut">
               <a:rPr lang="fr-FR" smtClean="0"/>
               <a:pPr/>
-              <a:t>11/7/13</a:t>
+              <a:t>11/18/13</a:t>
             </a:fld>
             <a:endParaRPr lang="fr-BE"/>
           </a:p>
@@ -1941,7 +1941,7 @@
             <a:fld id="{AA309A6D-C09C-4548-B29A-6CF363A7E532}" type="datetimeFigureOut">
               <a:rPr lang="fr-FR" smtClean="0"/>
               <a:pPr/>
-              <a:t>11/7/13</a:t>
+              <a:t>11/18/13</a:t>
             </a:fld>
             <a:endParaRPr lang="fr-BE"/>
           </a:p>
@@ -2170,7 +2170,7 @@
             <a:fld id="{AA309A6D-C09C-4548-B29A-6CF363A7E532}" type="datetimeFigureOut">
               <a:rPr lang="fr-FR" smtClean="0"/>
               <a:pPr/>
-              <a:t>11/7/13</a:t>
+              <a:t>11/18/13</a:t>
             </a:fld>
             <a:endParaRPr lang="fr-BE"/>
           </a:p>
@@ -2262,7 +2262,7 @@
             <a:fld id="{AA309A6D-C09C-4548-B29A-6CF363A7E532}" type="datetimeFigureOut">
               <a:rPr lang="fr-FR" smtClean="0"/>
               <a:pPr/>
-              <a:t>11/7/13</a:t>
+              <a:t>11/18/13</a:t>
             </a:fld>
             <a:endParaRPr lang="fr-BE"/>
           </a:p>
@@ -2531,7 +2531,7 @@
             <a:fld id="{AA309A6D-C09C-4548-B29A-6CF363A7E532}" type="datetimeFigureOut">
               <a:rPr lang="fr-FR" smtClean="0"/>
               <a:pPr/>
-              <a:t>11/7/13</a:t>
+              <a:t>11/18/13</a:t>
             </a:fld>
             <a:endParaRPr lang="fr-BE"/>
           </a:p>
@@ -2761,7 +2761,7 @@
             <a:fld id="{AA309A6D-C09C-4548-B29A-6CF363A7E532}" type="datetimeFigureOut">
               <a:rPr lang="fr-FR" smtClean="0"/>
               <a:pPr/>
-              <a:t>11/7/13</a:t>
+              <a:t>11/18/13</a:t>
             </a:fld>
             <a:endParaRPr lang="fr-BE"/>
           </a:p>
@@ -3262,7 +3262,7 @@
             <a:fld id="{AA309A6D-C09C-4548-B29A-6CF363A7E532}" type="datetimeFigureOut">
               <a:rPr lang="fr-FR" smtClean="0"/>
               <a:pPr/>
-              <a:t>11/7/13</a:t>
+              <a:t>11/18/13</a:t>
             </a:fld>
             <a:endParaRPr lang="fr-BE"/>
           </a:p>
@@ -4038,8 +4038,21 @@
             <a:pPr algn="just"/>
             <a:r>
               <a:rPr lang="en-US" dirty="0"/>
-              <a:t>For each item, your task is to tell us whether the sentence is true or false as a description of the picture it is paired with. For instance, in the example above, the sentence is true.</a:t>
-            </a:r>
+              <a:t>For each item, your task is to tell us whether the sentence is </a:t>
+            </a:r>
+            <a:r>
+              <a:rPr lang="en-US" dirty="0" smtClean="0"/>
+              <a:t>an appropriate description </a:t>
+            </a:r>
+            <a:r>
+              <a:rPr lang="en-US" dirty="0"/>
+              <a:t>of the picture it is paired with. For instance, in the example above, the sentence </a:t>
+            </a:r>
+            <a:r>
+              <a:rPr lang="en-US" dirty="0" smtClean="0"/>
+              <a:t>sounds appropriate.</a:t>
+            </a:r>
+            <a:endParaRPr lang="en-US" dirty="0"/>
           </a:p>
           <a:p>
             <a:pPr algn="just"/>
@@ -4053,11 +4066,67 @@
             </a:r>
             <a:r>
               <a:rPr lang="en-US" dirty="0"/>
-              <a:t>In fact, in many cases, it might not be entirely clear whether the sentence is false, but it may be a better or worse description of the picture. For this reason, you will be able to give more fine-grained judgments than a simple ‘True’ or ‘False’: you will give your answer along a continuum, by using the cursor to set the right end of a red line going between ‘False’ (left) and ‘True’ (right). The more the sentence seems to be a good description of the picture, the more you should move the end of the red line toward ‘True’. For example, this is the case for an example like the one above, and thus the best answer would look like what you see above, with the red bar all the way to the 'True' end. Conversely, if the sentence sounds very inappropriate, you should move the red line all the way to the 'False' </a:t>
+              <a:t>In fact, in many cases, it might not be entirely clear whether the sentence is </a:t>
             </a:r>
             <a:r>
               <a:rPr lang="en-US" dirty="0" smtClean="0"/>
-              <a:t>end.</a:t>
+              <a:t>inappropriate, </a:t>
+            </a:r>
+            <a:r>
+              <a:rPr lang="en-US" dirty="0"/>
+              <a:t>but it may be a better or worse description of the picture. For this reason, you will be able to give more fine-grained judgments than a simple </a:t>
+            </a:r>
+            <a:r>
+              <a:rPr lang="en-US" dirty="0" smtClean="0"/>
+              <a:t>‘Yes’ </a:t>
+            </a:r>
+            <a:r>
+              <a:rPr lang="en-US" dirty="0"/>
+              <a:t>or </a:t>
+            </a:r>
+            <a:r>
+              <a:rPr lang="en-US" dirty="0" smtClean="0"/>
+              <a:t>‘No’</a:t>
+            </a:r>
+            <a:r>
+              <a:rPr lang="en-US" dirty="0"/>
+              <a:t>: you will give your answer along a continuum, by using the cursor to set the right end of a red line going between </a:t>
+            </a:r>
+            <a:r>
+              <a:rPr lang="en-US" dirty="0" smtClean="0"/>
+              <a:t>‘No’ </a:t>
+            </a:r>
+            <a:r>
+              <a:rPr lang="en-US" dirty="0"/>
+              <a:t>(left) and </a:t>
+            </a:r>
+            <a:r>
+              <a:rPr lang="en-US" dirty="0" smtClean="0"/>
+              <a:t>‘Yes’ </a:t>
+            </a:r>
+            <a:r>
+              <a:rPr lang="en-US" dirty="0"/>
+              <a:t>(right). The more the sentence seems to be a good description of the picture, the more you should move the end of the red line toward </a:t>
+            </a:r>
+            <a:r>
+              <a:rPr lang="en-US" dirty="0" smtClean="0"/>
+              <a:t>‘Yes’</a:t>
+            </a:r>
+            <a:r>
+              <a:rPr lang="en-US" dirty="0"/>
+              <a:t>. For example, this is the case for an example like the one above, and thus the best answer would look like what you see above, with the red bar all the way to the `</a:t>
+            </a:r>
+            <a:r>
+              <a:rPr lang="en-US" dirty="0" smtClean="0"/>
+              <a:t>Yes' </a:t>
+            </a:r>
+            <a:r>
+              <a:rPr lang="en-US" dirty="0"/>
+              <a:t>end. Conversely, if the sentence sounds very inappropriate, you should move the red line all the way to the `</a:t>
+            </a:r>
+            <a:r>
+              <a:rPr lang="en-US" dirty="0" smtClean="0"/>
+              <a:t>No' end.</a:t>
             </a:r>
             <a:r>
               <a:rPr lang="fr-FR" sz="1000" dirty="0"/>
@@ -4080,11 +4149,7 @@
             </a:r>
             <a:r>
               <a:rPr lang="fr-FR" sz="2000" b="1" i="1" dirty="0" smtClean="0"/>
-              <a:t> </a:t>
-            </a:r>
-            <a:r>
-              <a:rPr lang="fr-FR" sz="2000" b="1" i="1" dirty="0" smtClean="0"/>
-              <a:t>SPACEBAR to </a:t>
+              <a:t> SPACEBAR to </a:t>
             </a:r>
             <a:r>
               <a:rPr lang="fr-FR" sz="2000" b="1" i="1" dirty="0" err="1" smtClean="0"/>
@@ -4114,9 +4179,35 @@
           </a:p>
         </p:txBody>
       </p:sp>
+      <p:sp>
+        <p:nvSpPr>
+          <p:cNvPr id="2" name="TextBox 1"/>
+          <p:cNvSpPr txBox="1"/>
+          <p:nvPr/>
+        </p:nvSpPr>
+        <p:spPr>
+          <a:xfrm>
+            <a:off x="7256589" y="2260994"/>
+            <a:ext cx="184666" cy="369332"/>
+          </a:xfrm>
+          <a:prstGeom prst="rect">
+            <a:avLst/>
+          </a:prstGeom>
+          <a:noFill/>
+        </p:spPr>
+        <p:txBody>
+          <a:bodyPr wrap="none" rtlCol="0">
+            <a:spAutoFit/>
+          </a:bodyPr>
+          <a:lstStyle/>
+          <a:p>
+            <a:endParaRPr lang="en-US" dirty="0"/>
+          </a:p>
+        </p:txBody>
+      </p:sp>
       <p:pic>
         <p:nvPicPr>
-          <p:cNvPr id="7" name="Picture 6"/>
+          <p:cNvPr id="3" name="Picture 2"/>
           <p:cNvPicPr>
             <a:picLocks noChangeAspect="1"/>
           </p:cNvPicPr>
@@ -4130,69 +4221,19 @@
         </p:blipFill>
         <p:spPr>
           <a:xfrm>
-            <a:off x="3419872" y="1124744"/>
-            <a:ext cx="1943363" cy="2088232"/>
+            <a:off x="3635896" y="1052736"/>
+            <a:ext cx="1930493" cy="2231143"/>
           </a:xfrm>
           <a:prstGeom prst="rect">
             <a:avLst/>
           </a:prstGeom>
-          <a:solidFill>
-            <a:srgbClr val="FFFFFF">
-              <a:shade val="85000"/>
-            </a:srgbClr>
-          </a:solidFill>
-          <a:ln w="190500" cap="rnd">
+          <a:ln>
             <a:solidFill>
-              <a:srgbClr val="FFFFFF"/>
+              <a:schemeClr val="tx1"/>
             </a:solidFill>
           </a:ln>
-          <a:effectLst>
-            <a:outerShdw blurRad="50000" algn="tl" rotWithShape="0">
-              <a:srgbClr val="000000">
-                <a:alpha val="41000"/>
-              </a:srgbClr>
-            </a:outerShdw>
-          </a:effectLst>
-          <a:scene3d>
-            <a:camera prst="orthographicFront"/>
-            <a:lightRig rig="twoPt" dir="t">
-              <a:rot lat="0" lon="0" rev="7800000"/>
-            </a:lightRig>
-          </a:scene3d>
-          <a:sp3d contourW="6350">
-            <a:bevelT w="50800" h="16510"/>
-            <a:contourClr>
-              <a:srgbClr val="C0C0C0"/>
-            </a:contourClr>
-          </a:sp3d>
         </p:spPr>
       </p:pic>
-      <p:sp>
-        <p:nvSpPr>
-          <p:cNvPr id="2" name="TextBox 1"/>
-          <p:cNvSpPr txBox="1"/>
-          <p:nvPr/>
-        </p:nvSpPr>
-        <p:spPr>
-          <a:xfrm>
-            <a:off x="7256589" y="2260994"/>
-            <a:ext cx="184666" cy="369332"/>
-          </a:xfrm>
-          <a:prstGeom prst="rect">
-            <a:avLst/>
-          </a:prstGeom>
-          <a:noFill/>
-        </p:spPr>
-        <p:txBody>
-          <a:bodyPr wrap="none" rtlCol="0">
-            <a:spAutoFit/>
-          </a:bodyPr>
-          <a:lstStyle/>
-          <a:p>
-            <a:endParaRPr lang="en-US" dirty="0"/>
-          </a:p>
-        </p:txBody>
-      </p:sp>
     </p:spTree>
   </p:cSld>
   <p:clrMapOvr>

</xml_diff>